<commit_message>
setting up examples and tests
mostly finished with the presentation
</commit_message>
<xml_diff>
--- a/dotNet/powershellbdd/AutomatedTestingForPowerShell.pptx
+++ b/dotNet/powershellbdd/AutomatedTestingForPowerShell.pptx
@@ -5,15 +5,30 @@
     <p:sldMasterId id="2147483756" r:id="rId1"/>
   </p:sldMasterIdLst>
   <p:notesMasterIdLst>
-    <p:notesMasterId r:id="rId8"/>
+    <p:notesMasterId r:id="rId23"/>
   </p:notesMasterIdLst>
   <p:sldIdLst>
     <p:sldId id="256" r:id="rId2"/>
-    <p:sldId id="271" r:id="rId3"/>
-    <p:sldId id="303" r:id="rId4"/>
-    <p:sldId id="326" r:id="rId5"/>
-    <p:sldId id="312" r:id="rId6"/>
-    <p:sldId id="297" r:id="rId7"/>
+    <p:sldId id="330" r:id="rId3"/>
+    <p:sldId id="271" r:id="rId4"/>
+    <p:sldId id="303" r:id="rId5"/>
+    <p:sldId id="328" r:id="rId6"/>
+    <p:sldId id="326" r:id="rId7"/>
+    <p:sldId id="329" r:id="rId8"/>
+    <p:sldId id="346" r:id="rId9"/>
+    <p:sldId id="348" r:id="rId10"/>
+    <p:sldId id="344" r:id="rId11"/>
+    <p:sldId id="345" r:id="rId12"/>
+    <p:sldId id="331" r:id="rId13"/>
+    <p:sldId id="338" r:id="rId14"/>
+    <p:sldId id="340" r:id="rId15"/>
+    <p:sldId id="339" r:id="rId16"/>
+    <p:sldId id="336" r:id="rId17"/>
+    <p:sldId id="343" r:id="rId18"/>
+    <p:sldId id="335" r:id="rId19"/>
+    <p:sldId id="337" r:id="rId20"/>
+    <p:sldId id="297" r:id="rId21"/>
+    <p:sldId id="341" r:id="rId22"/>
   </p:sldIdLst>
   <p:sldSz cx="9144000" cy="6858000" type="screen4x3"/>
   <p:notesSz cx="6858000" cy="9144000"/>
@@ -198,7 +213,7 @@
             <a:fld id="{F8705BBE-BC03-42F3-A30B-8ED0F940BFAD}" type="datetimeFigureOut">
               <a:rPr lang="en-US" smtClean="0"/>
               <a:pPr/>
-              <a:t>4/25/2012</a:t>
+              <a:t>4/27/2012</a:t>
             </a:fld>
             <a:endParaRPr lang="en-US"/>
           </a:p>
@@ -532,7 +547,99 @@
             <a:fld id="{DE419B9E-5588-4E3D-A5D7-A2ED02B734CE}" type="slidenum">
               <a:rPr lang="en-US" smtClean="0"/>
               <a:pPr/>
-              <a:t>2</a:t>
+              <a:t>3</a:t>
+            </a:fld>
+            <a:endParaRPr lang="en-US"/>
+          </a:p>
+        </p:txBody>
+      </p:sp>
+    </p:spTree>
+  </p:cSld>
+  <p:clrMapOvr>
+    <a:masterClrMapping/>
+  </p:clrMapOvr>
+</p:notes>
+</file>
+
+<file path=ppt/notesSlides/notesSlide2.xml><?xml version="1.0" encoding="utf-8"?>
+<p:notes xmlns:a="http://schemas.openxmlformats.org/drawingml/2006/main" xmlns:r="http://schemas.openxmlformats.org/officeDocument/2006/relationships" xmlns:p="http://schemas.openxmlformats.org/presentationml/2006/main">
+  <p:cSld>
+    <p:spTree>
+      <p:nvGrpSpPr>
+        <p:cNvPr id="1" name=""/>
+        <p:cNvGrpSpPr/>
+        <p:nvPr/>
+      </p:nvGrpSpPr>
+      <p:grpSpPr>
+        <a:xfrm>
+          <a:off x="0" y="0"/>
+          <a:ext cx="0" cy="0"/>
+          <a:chOff x="0" y="0"/>
+          <a:chExt cx="0" cy="0"/>
+        </a:xfrm>
+      </p:grpSpPr>
+      <p:sp>
+        <p:nvSpPr>
+          <p:cNvPr id="2" name="Slide Image Placeholder 1"/>
+          <p:cNvSpPr>
+            <a:spLocks noGrp="1" noRot="1" noChangeAspect="1"/>
+          </p:cNvSpPr>
+          <p:nvPr>
+            <p:ph type="sldImg"/>
+          </p:nvPr>
+        </p:nvSpPr>
+        <p:spPr/>
+      </p:sp>
+      <p:sp>
+        <p:nvSpPr>
+          <p:cNvPr id="3" name="Notes Placeholder 2"/>
+          <p:cNvSpPr>
+            <a:spLocks noGrp="1"/>
+          </p:cNvSpPr>
+          <p:nvPr>
+            <p:ph type="body" idx="1"/>
+          </p:nvPr>
+        </p:nvSpPr>
+        <p:spPr/>
+        <p:txBody>
+          <a:bodyPr>
+            <a:normAutofit/>
+          </a:bodyPr>
+          <a:lstStyle/>
+          <a:p>
+            <a:r>
+              <a:rPr lang="en-US" dirty="0" smtClean="0"/>
+              <a:t>– Only confidence in what you tested works in the scenarios you tested it in</a:t>
+            </a:r>
+          </a:p>
+          <a:p>
+            <a:r>
+              <a:rPr lang="en-US" dirty="0" smtClean="0"/>
+              <a:t> – unit testing is the hardest type of testing</a:t>
+            </a:r>
+            <a:endParaRPr lang="en-US" dirty="0"/>
+          </a:p>
+        </p:txBody>
+      </p:sp>
+      <p:sp>
+        <p:nvSpPr>
+          <p:cNvPr id="4" name="Slide Number Placeholder 3"/>
+          <p:cNvSpPr>
+            <a:spLocks noGrp="1"/>
+          </p:cNvSpPr>
+          <p:nvPr>
+            <p:ph type="sldNum" sz="quarter" idx="10"/>
+          </p:nvPr>
+        </p:nvSpPr>
+        <p:spPr/>
+        <p:txBody>
+          <a:bodyPr/>
+          <a:lstStyle/>
+          <a:p>
+            <a:fld id="{DE419B9E-5588-4E3D-A5D7-A2ED02B734CE}" type="slidenum">
+              <a:rPr lang="en-US" smtClean="0"/>
+              <a:pPr/>
+              <a:t>8</a:t>
             </a:fld>
             <a:endParaRPr lang="en-US"/>
           </a:p>
@@ -728,7 +835,7 @@
             <a:fld id="{C3CE9471-DEB6-4DE0-B19C-141FBC909CBF}" type="datetimeFigureOut">
               <a:rPr lang="en-US" smtClean="0"/>
               <a:pPr/>
-              <a:t>4/25/2012</a:t>
+              <a:t>4/27/2012</a:t>
             </a:fld>
             <a:endParaRPr lang="en-US"/>
           </a:p>
@@ -895,7 +1002,7 @@
             <a:fld id="{C3CE9471-DEB6-4DE0-B19C-141FBC909CBF}" type="datetimeFigureOut">
               <a:rPr lang="en-US" smtClean="0"/>
               <a:pPr/>
-              <a:t>4/25/2012</a:t>
+              <a:t>4/27/2012</a:t>
             </a:fld>
             <a:endParaRPr lang="en-US"/>
           </a:p>
@@ -1072,7 +1179,7 @@
             <a:fld id="{C3CE9471-DEB6-4DE0-B19C-141FBC909CBF}" type="datetimeFigureOut">
               <a:rPr lang="en-US" smtClean="0"/>
               <a:pPr/>
-              <a:t>4/25/2012</a:t>
+              <a:t>4/27/2012</a:t>
             </a:fld>
             <a:endParaRPr lang="en-US"/>
           </a:p>
@@ -1239,7 +1346,7 @@
             <a:fld id="{C3CE9471-DEB6-4DE0-B19C-141FBC909CBF}" type="datetimeFigureOut">
               <a:rPr lang="en-US" smtClean="0"/>
               <a:pPr/>
-              <a:t>4/25/2012</a:t>
+              <a:t>4/27/2012</a:t>
             </a:fld>
             <a:endParaRPr lang="en-US"/>
           </a:p>
@@ -1482,7 +1589,7 @@
             <a:fld id="{C3CE9471-DEB6-4DE0-B19C-141FBC909CBF}" type="datetimeFigureOut">
               <a:rPr lang="en-US" smtClean="0"/>
               <a:pPr/>
-              <a:t>4/25/2012</a:t>
+              <a:t>4/27/2012</a:t>
             </a:fld>
             <a:endParaRPr lang="en-US"/>
           </a:p>
@@ -1767,7 +1874,7 @@
             <a:fld id="{C3CE9471-DEB6-4DE0-B19C-141FBC909CBF}" type="datetimeFigureOut">
               <a:rPr lang="en-US" smtClean="0"/>
               <a:pPr/>
-              <a:t>4/25/2012</a:t>
+              <a:t>4/27/2012</a:t>
             </a:fld>
             <a:endParaRPr lang="en-US"/>
           </a:p>
@@ -2186,7 +2293,7 @@
             <a:fld id="{C3CE9471-DEB6-4DE0-B19C-141FBC909CBF}" type="datetimeFigureOut">
               <a:rPr lang="en-US" smtClean="0"/>
               <a:pPr/>
-              <a:t>4/25/2012</a:t>
+              <a:t>4/27/2012</a:t>
             </a:fld>
             <a:endParaRPr lang="en-US"/>
           </a:p>
@@ -2301,7 +2408,7 @@
             <a:fld id="{C3CE9471-DEB6-4DE0-B19C-141FBC909CBF}" type="datetimeFigureOut">
               <a:rPr lang="en-US" smtClean="0"/>
               <a:pPr/>
-              <a:t>4/25/2012</a:t>
+              <a:t>4/27/2012</a:t>
             </a:fld>
             <a:endParaRPr lang="en-US"/>
           </a:p>
@@ -2393,7 +2500,7 @@
             <a:fld id="{C3CE9471-DEB6-4DE0-B19C-141FBC909CBF}" type="datetimeFigureOut">
               <a:rPr lang="en-US" smtClean="0"/>
               <a:pPr/>
-              <a:t>4/25/2012</a:t>
+              <a:t>4/27/2012</a:t>
             </a:fld>
             <a:endParaRPr lang="en-US"/>
           </a:p>
@@ -2667,7 +2774,7 @@
             <a:fld id="{C3CE9471-DEB6-4DE0-B19C-141FBC909CBF}" type="datetimeFigureOut">
               <a:rPr lang="en-US" smtClean="0"/>
               <a:pPr/>
-              <a:t>4/25/2012</a:t>
+              <a:t>4/27/2012</a:t>
             </a:fld>
             <a:endParaRPr lang="en-US"/>
           </a:p>
@@ -2921,7 +3028,7 @@
             <a:fld id="{C3CE9471-DEB6-4DE0-B19C-141FBC909CBF}" type="datetimeFigureOut">
               <a:rPr lang="en-US" smtClean="0"/>
               <a:pPr/>
-              <a:t>4/25/2012</a:t>
+              <a:t>4/27/2012</a:t>
             </a:fld>
             <a:endParaRPr lang="en-US"/>
           </a:p>
@@ -3131,7 +3238,7 @@
             <a:fld id="{C3CE9471-DEB6-4DE0-B19C-141FBC909CBF}" type="datetimeFigureOut">
               <a:rPr lang="en-US" smtClean="0"/>
               <a:pPr/>
-              <a:t>4/25/2012</a:t>
+              <a:t>4/27/2012</a:t>
             </a:fld>
             <a:endParaRPr lang="en-US"/>
           </a:p>
@@ -3576,7 +3683,1111 @@
       </p:sp>
       <p:pic>
         <p:nvPicPr>
-          <p:cNvPr id="4" name="Picture 2"/>
+          <p:cNvPr id="2050" name="Picture 2"/>
+          <p:cNvPicPr>
+            <a:picLocks noChangeAspect="1" noChangeArrowheads="1"/>
+          </p:cNvPicPr>
+          <p:nvPr/>
+        </p:nvPicPr>
+        <p:blipFill>
+          <a:blip r:embed="rId2" cstate="print"/>
+          <a:srcRect l="933" t="17647"/>
+          <a:stretch>
+            <a:fillRect/>
+          </a:stretch>
+        </p:blipFill>
+        <p:spPr bwMode="auto">
+          <a:xfrm>
+            <a:off x="236868" y="4038600"/>
+            <a:ext cx="8670264" cy="2286000"/>
+          </a:xfrm>
+          <a:prstGeom prst="rect">
+            <a:avLst/>
+          </a:prstGeom>
+          <a:noFill/>
+          <a:ln w="9525">
+            <a:noFill/>
+            <a:miter lim="800000"/>
+            <a:headEnd/>
+            <a:tailEnd/>
+          </a:ln>
+        </p:spPr>
+      </p:pic>
+    </p:spTree>
+  </p:cSld>
+  <p:clrMapOvr>
+    <a:masterClrMapping/>
+  </p:clrMapOvr>
+  <p:timing>
+    <p:tnLst>
+      <p:par>
+        <p:cTn id="1" dur="indefinite" restart="never" nodeType="tmRoot"/>
+      </p:par>
+    </p:tnLst>
+  </p:timing>
+</p:sld>
+</file>
+
+<file path=ppt/slides/slide10.xml><?xml version="1.0" encoding="utf-8"?>
+<p:sld xmlns:a="http://schemas.openxmlformats.org/drawingml/2006/main" xmlns:r="http://schemas.openxmlformats.org/officeDocument/2006/relationships" xmlns:p="http://schemas.openxmlformats.org/presentationml/2006/main">
+  <p:cSld>
+    <p:spTree>
+      <p:nvGrpSpPr>
+        <p:cNvPr id="1" name=""/>
+        <p:cNvGrpSpPr/>
+        <p:nvPr/>
+      </p:nvGrpSpPr>
+      <p:grpSpPr>
+        <a:xfrm>
+          <a:off x="0" y="0"/>
+          <a:ext cx="0" cy="0"/>
+          <a:chOff x="0" y="0"/>
+          <a:chExt cx="0" cy="0"/>
+        </a:xfrm>
+      </p:grpSpPr>
+      <p:sp>
+        <p:nvSpPr>
+          <p:cNvPr id="2" name="Title 1"/>
+          <p:cNvSpPr>
+            <a:spLocks noGrp="1"/>
+          </p:cNvSpPr>
+          <p:nvPr>
+            <p:ph type="title"/>
+          </p:nvPr>
+        </p:nvSpPr>
+        <p:spPr/>
+        <p:txBody>
+          <a:bodyPr/>
+          <a:lstStyle/>
+          <a:p>
+            <a:r>
+              <a:rPr lang="en-US" dirty="0" smtClean="0"/>
+              <a:t>Why do automated testing?</a:t>
+            </a:r>
+            <a:endParaRPr lang="en-US" dirty="0"/>
+          </a:p>
+        </p:txBody>
+      </p:sp>
+      <p:sp>
+        <p:nvSpPr>
+          <p:cNvPr id="3" name="Content Placeholder 2"/>
+          <p:cNvSpPr>
+            <a:spLocks noGrp="1"/>
+          </p:cNvSpPr>
+          <p:nvPr>
+            <p:ph idx="1"/>
+          </p:nvPr>
+        </p:nvSpPr>
+        <p:spPr/>
+        <p:txBody>
+          <a:bodyPr/>
+          <a:lstStyle/>
+          <a:p>
+            <a:r>
+              <a:rPr lang="en-US" dirty="0" smtClean="0"/>
+              <a:t>“We never touch that piece of code, it just works” == “We have no idea WTF it does and have no test automation on it to help us figure it out.”  == “We trust in what we don’t understand”</a:t>
+            </a:r>
+            <a:endParaRPr lang="en-US" dirty="0"/>
+          </a:p>
+        </p:txBody>
+      </p:sp>
+    </p:spTree>
+  </p:cSld>
+  <p:clrMapOvr>
+    <a:masterClrMapping/>
+  </p:clrMapOvr>
+  <p:timing>
+    <p:tnLst>
+      <p:par>
+        <p:cTn id="1" dur="indefinite" restart="never" nodeType="tmRoot"/>
+      </p:par>
+    </p:tnLst>
+  </p:timing>
+</p:sld>
+</file>
+
+<file path=ppt/slides/slide11.xml><?xml version="1.0" encoding="utf-8"?>
+<p:sld xmlns:a="http://schemas.openxmlformats.org/drawingml/2006/main" xmlns:r="http://schemas.openxmlformats.org/officeDocument/2006/relationships" xmlns:p="http://schemas.openxmlformats.org/presentationml/2006/main">
+  <p:cSld>
+    <p:spTree>
+      <p:nvGrpSpPr>
+        <p:cNvPr id="1" name=""/>
+        <p:cNvGrpSpPr/>
+        <p:nvPr/>
+      </p:nvGrpSpPr>
+      <p:grpSpPr>
+        <a:xfrm>
+          <a:off x="0" y="0"/>
+          <a:ext cx="0" cy="0"/>
+          <a:chOff x="0" y="0"/>
+          <a:chExt cx="0" cy="0"/>
+        </a:xfrm>
+      </p:grpSpPr>
+      <p:sp>
+        <p:nvSpPr>
+          <p:cNvPr id="2" name="Title 1"/>
+          <p:cNvSpPr>
+            <a:spLocks noGrp="1"/>
+          </p:cNvSpPr>
+          <p:nvPr>
+            <p:ph type="title"/>
+          </p:nvPr>
+        </p:nvSpPr>
+        <p:spPr/>
+        <p:txBody>
+          <a:bodyPr/>
+          <a:lstStyle/>
+          <a:p>
+            <a:r>
+              <a:rPr lang="en-US" dirty="0" smtClean="0"/>
+              <a:t>So why do automated testing?</a:t>
+            </a:r>
+            <a:endParaRPr lang="en-US" dirty="0"/>
+          </a:p>
+        </p:txBody>
+      </p:sp>
+      <p:sp>
+        <p:nvSpPr>
+          <p:cNvPr id="3" name="Content Placeholder 2"/>
+          <p:cNvSpPr>
+            <a:spLocks noGrp="1"/>
+          </p:cNvSpPr>
+          <p:nvPr>
+            <p:ph idx="1"/>
+          </p:nvPr>
+        </p:nvSpPr>
+        <p:spPr/>
+        <p:txBody>
+          <a:bodyPr/>
+          <a:lstStyle/>
+          <a:p>
+            <a:r>
+              <a:rPr lang="en-US" dirty="0" smtClean="0"/>
+              <a:t>Maintenance – change is a constant</a:t>
+            </a:r>
+          </a:p>
+          <a:p>
+            <a:r>
+              <a:rPr lang="en-US" dirty="0" smtClean="0"/>
+              <a:t>Feedback cycles</a:t>
+            </a:r>
+          </a:p>
+          <a:p>
+            <a:r>
+              <a:rPr lang="en-US" dirty="0" smtClean="0"/>
+              <a:t>Scenarios / edge cases</a:t>
+            </a:r>
+          </a:p>
+          <a:p>
+            <a:r>
+              <a:rPr lang="en-US" dirty="0" smtClean="0"/>
+              <a:t>Gives you confidence in the code</a:t>
+            </a:r>
+          </a:p>
+          <a:p>
+            <a:pPr lvl="1"/>
+            <a:r>
+              <a:rPr lang="en-US" dirty="0" smtClean="0"/>
+              <a:t>Works appropriately</a:t>
+            </a:r>
+            <a:endParaRPr lang="en-US" dirty="0" smtClean="0"/>
+          </a:p>
+          <a:p>
+            <a:endParaRPr lang="en-US" dirty="0"/>
+          </a:p>
+        </p:txBody>
+      </p:sp>
+    </p:spTree>
+  </p:cSld>
+  <p:clrMapOvr>
+    <a:masterClrMapping/>
+  </p:clrMapOvr>
+  <p:timing>
+    <p:tnLst>
+      <p:par>
+        <p:cTn id="1" dur="indefinite" restart="never" nodeType="tmRoot"/>
+      </p:par>
+    </p:tnLst>
+  </p:timing>
+</p:sld>
+</file>
+
+<file path=ppt/slides/slide12.xml><?xml version="1.0" encoding="utf-8"?>
+<p:sld xmlns:a="http://schemas.openxmlformats.org/drawingml/2006/main" xmlns:r="http://schemas.openxmlformats.org/officeDocument/2006/relationships" xmlns:p="http://schemas.openxmlformats.org/presentationml/2006/main">
+  <p:cSld>
+    <p:spTree>
+      <p:nvGrpSpPr>
+        <p:cNvPr id="1" name=""/>
+        <p:cNvGrpSpPr/>
+        <p:nvPr/>
+      </p:nvGrpSpPr>
+      <p:grpSpPr>
+        <a:xfrm>
+          <a:off x="0" y="0"/>
+          <a:ext cx="0" cy="0"/>
+          <a:chOff x="0" y="0"/>
+          <a:chExt cx="0" cy="0"/>
+        </a:xfrm>
+      </p:grpSpPr>
+      <p:sp>
+        <p:nvSpPr>
+          <p:cNvPr id="2" name="Title 1"/>
+          <p:cNvSpPr>
+            <a:spLocks noGrp="1"/>
+          </p:cNvSpPr>
+          <p:nvPr>
+            <p:ph type="title"/>
+          </p:nvPr>
+        </p:nvSpPr>
+        <p:spPr/>
+        <p:txBody>
+          <a:bodyPr>
+            <a:normAutofit fontScale="90000"/>
+          </a:bodyPr>
+          <a:lstStyle/>
+          <a:p>
+            <a:r>
+              <a:rPr lang="en-US" dirty="0" smtClean="0"/>
+              <a:t>What are the types of automated tests?</a:t>
+            </a:r>
+            <a:endParaRPr lang="en-US" dirty="0"/>
+          </a:p>
+        </p:txBody>
+      </p:sp>
+      <p:sp>
+        <p:nvSpPr>
+          <p:cNvPr id="3" name="Content Placeholder 2"/>
+          <p:cNvSpPr>
+            <a:spLocks noGrp="1"/>
+          </p:cNvSpPr>
+          <p:nvPr>
+            <p:ph idx="1"/>
+          </p:nvPr>
+        </p:nvSpPr>
+        <p:spPr/>
+        <p:txBody>
+          <a:bodyPr>
+            <a:normAutofit/>
+          </a:bodyPr>
+          <a:lstStyle/>
+          <a:p>
+            <a:pPr marL="342900" lvl="1" indent="-342900">
+              <a:buFont typeface="Arial" pitchFamily="34" charset="0"/>
+              <a:buChar char="•"/>
+            </a:pPr>
+            <a:r>
+              <a:rPr lang="en-US" dirty="0" smtClean="0"/>
+              <a:t>White box</a:t>
+            </a:r>
+            <a:r>
+              <a:rPr lang="en-US" dirty="0" smtClean="0"/>
+              <a:t> </a:t>
+            </a:r>
+            <a:r>
+              <a:rPr lang="en-US" dirty="0" smtClean="0"/>
+              <a:t>(</a:t>
+            </a:r>
+            <a:r>
+              <a:rPr lang="en-US" dirty="0" err="1" smtClean="0"/>
+              <a:t>MSTest</a:t>
+            </a:r>
+            <a:r>
+              <a:rPr lang="en-US" dirty="0" smtClean="0"/>
+              <a:t> </a:t>
+            </a:r>
+            <a:r>
+              <a:rPr lang="en-US" dirty="0" smtClean="0"/>
+              <a:t>/ </a:t>
+            </a:r>
+            <a:r>
+              <a:rPr lang="en-US" dirty="0" err="1" smtClean="0"/>
+              <a:t>Nunit</a:t>
+            </a:r>
+            <a:r>
+              <a:rPr lang="en-US" dirty="0" smtClean="0"/>
+              <a:t> / </a:t>
+            </a:r>
+            <a:r>
+              <a:rPr lang="en-US" dirty="0" err="1" smtClean="0"/>
+              <a:t>xUnit</a:t>
+            </a:r>
+            <a:r>
+              <a:rPr lang="en-US" dirty="0" smtClean="0"/>
+              <a:t> / </a:t>
+            </a:r>
+            <a:r>
+              <a:rPr lang="en-US" dirty="0" err="1" smtClean="0"/>
+              <a:t>MbUnit</a:t>
+            </a:r>
+            <a:r>
+              <a:rPr lang="en-US" dirty="0" smtClean="0"/>
+              <a:t>)</a:t>
+            </a:r>
+          </a:p>
+          <a:p>
+            <a:pPr lvl="1"/>
+            <a:r>
+              <a:rPr lang="en-US" dirty="0" smtClean="0"/>
+              <a:t>Unit</a:t>
+            </a:r>
+          </a:p>
+          <a:p>
+            <a:pPr lvl="1"/>
+            <a:r>
+              <a:rPr lang="en-US" dirty="0" smtClean="0"/>
+              <a:t>Integration</a:t>
+            </a:r>
+          </a:p>
+          <a:p>
+            <a:pPr lvl="2"/>
+            <a:r>
+              <a:rPr lang="en-US" dirty="0" smtClean="0"/>
+              <a:t>Functionality</a:t>
+            </a:r>
+          </a:p>
+          <a:p>
+            <a:pPr lvl="2"/>
+            <a:r>
+              <a:rPr lang="en-US" dirty="0" smtClean="0"/>
+              <a:t>Database Tests</a:t>
+            </a:r>
+          </a:p>
+          <a:p>
+            <a:r>
+              <a:rPr lang="en-US" dirty="0" smtClean="0"/>
+              <a:t>Black box (</a:t>
+            </a:r>
+            <a:r>
+              <a:rPr lang="en-US" dirty="0" err="1" smtClean="0"/>
+              <a:t>FitNesse</a:t>
+            </a:r>
+            <a:r>
+              <a:rPr lang="en-US" dirty="0" smtClean="0"/>
+              <a:t>)</a:t>
+            </a:r>
+          </a:p>
+          <a:p>
+            <a:pPr lvl="1"/>
+            <a:r>
+              <a:rPr lang="en-US" dirty="0" smtClean="0"/>
+              <a:t>End 2 End – System Integration Testing</a:t>
+            </a:r>
+          </a:p>
+          <a:p>
+            <a:r>
+              <a:rPr lang="en-US" dirty="0" smtClean="0"/>
+              <a:t>Performance testing</a:t>
+            </a:r>
+            <a:endParaRPr lang="en-US" dirty="0"/>
+          </a:p>
+        </p:txBody>
+      </p:sp>
+    </p:spTree>
+  </p:cSld>
+  <p:clrMapOvr>
+    <a:masterClrMapping/>
+  </p:clrMapOvr>
+  <p:timing>
+    <p:tnLst>
+      <p:par>
+        <p:cTn id="1" dur="indefinite" restart="never" nodeType="tmRoot"/>
+      </p:par>
+    </p:tnLst>
+  </p:timing>
+</p:sld>
+</file>
+
+<file path=ppt/slides/slide13.xml><?xml version="1.0" encoding="utf-8"?>
+<p:sld xmlns:a="http://schemas.openxmlformats.org/drawingml/2006/main" xmlns:r="http://schemas.openxmlformats.org/officeDocument/2006/relationships" xmlns:p="http://schemas.openxmlformats.org/presentationml/2006/main">
+  <p:cSld>
+    <p:spTree>
+      <p:nvGrpSpPr>
+        <p:cNvPr id="1" name=""/>
+        <p:cNvGrpSpPr/>
+        <p:nvPr/>
+      </p:nvGrpSpPr>
+      <p:grpSpPr>
+        <a:xfrm>
+          <a:off x="0" y="0"/>
+          <a:ext cx="0" cy="0"/>
+          <a:chOff x="0" y="0"/>
+          <a:chExt cx="0" cy="0"/>
+        </a:xfrm>
+      </p:grpSpPr>
+      <p:sp>
+        <p:nvSpPr>
+          <p:cNvPr id="2" name="Title 1"/>
+          <p:cNvSpPr>
+            <a:spLocks noGrp="1"/>
+          </p:cNvSpPr>
+          <p:nvPr>
+            <p:ph type="title"/>
+          </p:nvPr>
+        </p:nvSpPr>
+        <p:spPr/>
+        <p:txBody>
+          <a:bodyPr>
+            <a:normAutofit fontScale="90000"/>
+          </a:bodyPr>
+          <a:lstStyle/>
+          <a:p>
+            <a:r>
+              <a:rPr lang="en-US" dirty="0" smtClean="0"/>
+              <a:t>What are the types of automated tests?</a:t>
+            </a:r>
+            <a:endParaRPr lang="en-US" dirty="0"/>
+          </a:p>
+        </p:txBody>
+      </p:sp>
+      <p:sp>
+        <p:nvSpPr>
+          <p:cNvPr id="3" name="Content Placeholder 2"/>
+          <p:cNvSpPr>
+            <a:spLocks noGrp="1"/>
+          </p:cNvSpPr>
+          <p:nvPr>
+            <p:ph idx="1"/>
+          </p:nvPr>
+        </p:nvSpPr>
+        <p:spPr/>
+        <p:txBody>
+          <a:bodyPr>
+            <a:normAutofit/>
+          </a:bodyPr>
+          <a:lstStyle/>
+          <a:p>
+            <a:pPr marL="342900" lvl="1" indent="-342900">
+              <a:buFont typeface="Arial" pitchFamily="34" charset="0"/>
+              <a:buChar char="•"/>
+            </a:pPr>
+            <a:r>
+              <a:rPr lang="en-US" dirty="0" smtClean="0"/>
+              <a:t>White box (</a:t>
+            </a:r>
+            <a:r>
+              <a:rPr lang="en-US" dirty="0" err="1" smtClean="0"/>
+              <a:t>MSTest</a:t>
+            </a:r>
+            <a:r>
+              <a:rPr lang="en-US" dirty="0" smtClean="0"/>
+              <a:t> </a:t>
+            </a:r>
+            <a:r>
+              <a:rPr lang="en-US" dirty="0" smtClean="0"/>
+              <a:t>/ </a:t>
+            </a:r>
+            <a:r>
+              <a:rPr lang="en-US" dirty="0" err="1" smtClean="0"/>
+              <a:t>Nunit</a:t>
+            </a:r>
+            <a:r>
+              <a:rPr lang="en-US" dirty="0" smtClean="0"/>
+              <a:t> / </a:t>
+            </a:r>
+            <a:r>
+              <a:rPr lang="en-US" dirty="0" err="1" smtClean="0"/>
+              <a:t>xUnit</a:t>
+            </a:r>
+            <a:r>
+              <a:rPr lang="en-US" dirty="0" smtClean="0"/>
+              <a:t> / </a:t>
+            </a:r>
+            <a:r>
+              <a:rPr lang="en-US" dirty="0" err="1" smtClean="0"/>
+              <a:t>MbUnit</a:t>
+            </a:r>
+            <a:r>
+              <a:rPr lang="en-US" dirty="0" smtClean="0"/>
+              <a:t>)</a:t>
+            </a:r>
+          </a:p>
+          <a:p>
+            <a:pPr lvl="1"/>
+            <a:r>
+              <a:rPr lang="en-US" dirty="0" smtClean="0"/>
+              <a:t>Unit</a:t>
+            </a:r>
+          </a:p>
+          <a:p>
+            <a:pPr lvl="1"/>
+            <a:r>
+              <a:rPr lang="en-US" dirty="0" smtClean="0"/>
+              <a:t>Integration</a:t>
+            </a:r>
+          </a:p>
+          <a:p>
+            <a:pPr lvl="2"/>
+            <a:r>
+              <a:rPr lang="en-US" dirty="0" smtClean="0"/>
+              <a:t>Functionality</a:t>
+            </a:r>
+          </a:p>
+          <a:p>
+            <a:pPr lvl="2"/>
+            <a:r>
+              <a:rPr lang="en-US" dirty="0" smtClean="0"/>
+              <a:t>Database Tests</a:t>
+            </a:r>
+          </a:p>
+          <a:p>
+            <a:r>
+              <a:rPr lang="en-US" strike="sngStrike" dirty="0" smtClean="0"/>
+              <a:t>Black </a:t>
+            </a:r>
+            <a:r>
+              <a:rPr lang="en-US" strike="sngStrike" dirty="0" smtClean="0"/>
+              <a:t>box </a:t>
+            </a:r>
+            <a:r>
+              <a:rPr lang="en-US" strike="sngStrike" dirty="0" smtClean="0"/>
+              <a:t>(</a:t>
+            </a:r>
+            <a:r>
+              <a:rPr lang="en-US" strike="sngStrike" dirty="0" err="1" smtClean="0"/>
+              <a:t>FitNesse</a:t>
+            </a:r>
+            <a:r>
+              <a:rPr lang="en-US" strike="sngStrike" dirty="0" smtClean="0"/>
+              <a:t>)</a:t>
+            </a:r>
+            <a:endParaRPr lang="en-US" strike="sngStrike" dirty="0" smtClean="0"/>
+          </a:p>
+          <a:p>
+            <a:pPr lvl="1"/>
+            <a:r>
+              <a:rPr lang="en-US" strike="sngStrike" dirty="0" smtClean="0"/>
+              <a:t>End 2 End – System Integration Testing</a:t>
+            </a:r>
+          </a:p>
+          <a:p>
+            <a:r>
+              <a:rPr lang="en-US" strike="sngStrike" dirty="0" smtClean="0"/>
+              <a:t>Performance testing</a:t>
+            </a:r>
+            <a:endParaRPr lang="en-US" strike="sngStrike" dirty="0"/>
+          </a:p>
+        </p:txBody>
+      </p:sp>
+    </p:spTree>
+  </p:cSld>
+  <p:clrMapOvr>
+    <a:masterClrMapping/>
+  </p:clrMapOvr>
+  <p:timing>
+    <p:tnLst>
+      <p:par>
+        <p:cTn id="1" dur="indefinite" restart="never" nodeType="tmRoot"/>
+      </p:par>
+    </p:tnLst>
+  </p:timing>
+</p:sld>
+</file>
+
+<file path=ppt/slides/slide14.xml><?xml version="1.0" encoding="utf-8"?>
+<p:sld xmlns:a="http://schemas.openxmlformats.org/drawingml/2006/main" xmlns:r="http://schemas.openxmlformats.org/officeDocument/2006/relationships" xmlns:p="http://schemas.openxmlformats.org/presentationml/2006/main">
+  <p:cSld>
+    <p:spTree>
+      <p:nvGrpSpPr>
+        <p:cNvPr id="1" name=""/>
+        <p:cNvGrpSpPr/>
+        <p:nvPr/>
+      </p:nvGrpSpPr>
+      <p:grpSpPr>
+        <a:xfrm>
+          <a:off x="0" y="0"/>
+          <a:ext cx="0" cy="0"/>
+          <a:chOff x="0" y="0"/>
+          <a:chExt cx="0" cy="0"/>
+        </a:xfrm>
+      </p:grpSpPr>
+      <p:sp>
+        <p:nvSpPr>
+          <p:cNvPr id="2" name="Title 1"/>
+          <p:cNvSpPr>
+            <a:spLocks noGrp="1"/>
+          </p:cNvSpPr>
+          <p:nvPr>
+            <p:ph type="title"/>
+          </p:nvPr>
+        </p:nvSpPr>
+        <p:spPr/>
+        <p:txBody>
+          <a:bodyPr>
+            <a:normAutofit fontScale="90000"/>
+          </a:bodyPr>
+          <a:lstStyle/>
+          <a:p>
+            <a:r>
+              <a:rPr lang="en-US" dirty="0" smtClean="0"/>
+              <a:t>What are the types of automated tests?</a:t>
+            </a:r>
+            <a:endParaRPr lang="en-US" dirty="0"/>
+          </a:p>
+        </p:txBody>
+      </p:sp>
+      <p:sp>
+        <p:nvSpPr>
+          <p:cNvPr id="3" name="Content Placeholder 2"/>
+          <p:cNvSpPr>
+            <a:spLocks noGrp="1"/>
+          </p:cNvSpPr>
+          <p:nvPr>
+            <p:ph idx="1"/>
+          </p:nvPr>
+        </p:nvSpPr>
+        <p:spPr/>
+        <p:txBody>
+          <a:bodyPr>
+            <a:normAutofit lnSpcReduction="10000"/>
+          </a:bodyPr>
+          <a:lstStyle/>
+          <a:p>
+            <a:r>
+              <a:rPr lang="en-US" dirty="0" smtClean="0"/>
+              <a:t>White box</a:t>
+            </a:r>
+          </a:p>
+          <a:p>
+            <a:pPr lvl="1"/>
+            <a:r>
+              <a:rPr lang="en-US" dirty="0" smtClean="0"/>
+              <a:t>Unit</a:t>
+            </a:r>
+          </a:p>
+          <a:p>
+            <a:pPr lvl="1"/>
+            <a:r>
+              <a:rPr lang="en-US" dirty="0" smtClean="0"/>
+              <a:t>Integration</a:t>
+            </a:r>
+          </a:p>
+          <a:p>
+            <a:pPr lvl="2"/>
+            <a:r>
+              <a:rPr lang="en-US" dirty="0" smtClean="0"/>
+              <a:t>Functionality</a:t>
+            </a:r>
+          </a:p>
+          <a:p>
+            <a:pPr lvl="2"/>
+            <a:r>
+              <a:rPr lang="en-US" dirty="0" smtClean="0"/>
+              <a:t>Database Tests</a:t>
+            </a:r>
+          </a:p>
+          <a:p>
+            <a:pPr>
+              <a:buNone/>
+            </a:pPr>
+            <a:endParaRPr lang="en-US" dirty="0" smtClean="0"/>
+          </a:p>
+          <a:p>
+            <a:pPr>
+              <a:buNone/>
+            </a:pPr>
+            <a:r>
+              <a:rPr lang="en-US" dirty="0" smtClean="0"/>
+              <a:t>Why do we categorize? Is it because we are just developers and everything has a place?		</a:t>
+            </a:r>
+          </a:p>
+        </p:txBody>
+      </p:sp>
+    </p:spTree>
+  </p:cSld>
+  <p:clrMapOvr>
+    <a:masterClrMapping/>
+  </p:clrMapOvr>
+  <p:timing>
+    <p:tnLst>
+      <p:par>
+        <p:cTn id="1" dur="indefinite" restart="never" nodeType="tmRoot"/>
+      </p:par>
+    </p:tnLst>
+  </p:timing>
+</p:sld>
+</file>
+
+<file path=ppt/slides/slide15.xml><?xml version="1.0" encoding="utf-8"?>
+<p:sld xmlns:a="http://schemas.openxmlformats.org/drawingml/2006/main" xmlns:r="http://schemas.openxmlformats.org/officeDocument/2006/relationships" xmlns:p="http://schemas.openxmlformats.org/presentationml/2006/main">
+  <p:cSld>
+    <p:spTree>
+      <p:nvGrpSpPr>
+        <p:cNvPr id="1" name=""/>
+        <p:cNvGrpSpPr/>
+        <p:nvPr/>
+      </p:nvGrpSpPr>
+      <p:grpSpPr>
+        <a:xfrm>
+          <a:off x="0" y="0"/>
+          <a:ext cx="0" cy="0"/>
+          <a:chOff x="0" y="0"/>
+          <a:chExt cx="0" cy="0"/>
+        </a:xfrm>
+      </p:grpSpPr>
+      <p:sp>
+        <p:nvSpPr>
+          <p:cNvPr id="2" name="Title 1"/>
+          <p:cNvSpPr>
+            <a:spLocks noGrp="1"/>
+          </p:cNvSpPr>
+          <p:nvPr>
+            <p:ph type="title"/>
+          </p:nvPr>
+        </p:nvSpPr>
+        <p:spPr/>
+        <p:txBody>
+          <a:bodyPr>
+            <a:normAutofit/>
+          </a:bodyPr>
+          <a:lstStyle/>
+          <a:p>
+            <a:r>
+              <a:rPr lang="en-US" dirty="0" smtClean="0"/>
+              <a:t>Unit Testing?</a:t>
+            </a:r>
+            <a:endParaRPr lang="en-US" dirty="0"/>
+          </a:p>
+        </p:txBody>
+      </p:sp>
+      <p:sp>
+        <p:nvSpPr>
+          <p:cNvPr id="3" name="Content Placeholder 2"/>
+          <p:cNvSpPr>
+            <a:spLocks noGrp="1"/>
+          </p:cNvSpPr>
+          <p:nvPr>
+            <p:ph idx="1"/>
+          </p:nvPr>
+        </p:nvSpPr>
+        <p:spPr/>
+        <p:txBody>
+          <a:bodyPr>
+            <a:normAutofit lnSpcReduction="10000"/>
+          </a:bodyPr>
+          <a:lstStyle/>
+          <a:p>
+            <a:r>
+              <a:rPr lang="en-US" dirty="0" smtClean="0"/>
+              <a:t>White box</a:t>
+            </a:r>
+          </a:p>
+          <a:p>
+            <a:pPr lvl="1"/>
+            <a:r>
+              <a:rPr lang="en-US" dirty="0" smtClean="0"/>
+              <a:t>Unit</a:t>
+            </a:r>
+          </a:p>
+          <a:p>
+            <a:pPr lvl="1"/>
+            <a:r>
+              <a:rPr lang="en-US" dirty="0" smtClean="0"/>
+              <a:t>Integration</a:t>
+            </a:r>
+          </a:p>
+          <a:p>
+            <a:pPr lvl="2"/>
+            <a:r>
+              <a:rPr lang="en-US" dirty="0" smtClean="0"/>
+              <a:t>Functionality</a:t>
+            </a:r>
+          </a:p>
+          <a:p>
+            <a:pPr lvl="2"/>
+            <a:r>
+              <a:rPr lang="en-US" dirty="0" smtClean="0"/>
+              <a:t>Database Tests</a:t>
+            </a:r>
+          </a:p>
+          <a:p>
+            <a:pPr>
+              <a:buNone/>
+            </a:pPr>
+            <a:endParaRPr lang="en-US" dirty="0" smtClean="0"/>
+          </a:p>
+          <a:p>
+            <a:pPr>
+              <a:buNone/>
+            </a:pPr>
+            <a:r>
+              <a:rPr lang="en-US" dirty="0" smtClean="0"/>
+              <a:t>Why do we categorize? Is it because we are just developers and everything has a place?		</a:t>
+            </a:r>
+          </a:p>
+        </p:txBody>
+      </p:sp>
+    </p:spTree>
+  </p:cSld>
+  <p:clrMapOvr>
+    <a:masterClrMapping/>
+  </p:clrMapOvr>
+  <p:timing>
+    <p:tnLst>
+      <p:par>
+        <p:cTn id="1" dur="indefinite" restart="never" nodeType="tmRoot"/>
+      </p:par>
+    </p:tnLst>
+  </p:timing>
+</p:sld>
+</file>
+
+<file path=ppt/slides/slide16.xml><?xml version="1.0" encoding="utf-8"?>
+<p:sld xmlns:a="http://schemas.openxmlformats.org/drawingml/2006/main" xmlns:r="http://schemas.openxmlformats.org/officeDocument/2006/relationships" xmlns:p="http://schemas.openxmlformats.org/presentationml/2006/main">
+  <p:cSld>
+    <p:spTree>
+      <p:nvGrpSpPr>
+        <p:cNvPr id="1" name=""/>
+        <p:cNvGrpSpPr/>
+        <p:nvPr/>
+      </p:nvGrpSpPr>
+      <p:grpSpPr>
+        <a:xfrm>
+          <a:off x="0" y="0"/>
+          <a:ext cx="0" cy="0"/>
+          <a:chOff x="0" y="0"/>
+          <a:chExt cx="0" cy="0"/>
+        </a:xfrm>
+      </p:grpSpPr>
+      <p:sp>
+        <p:nvSpPr>
+          <p:cNvPr id="2" name="Title 1"/>
+          <p:cNvSpPr>
+            <a:spLocks noGrp="1"/>
+          </p:cNvSpPr>
+          <p:nvPr>
+            <p:ph type="title"/>
+          </p:nvPr>
+        </p:nvSpPr>
+        <p:spPr/>
+        <p:txBody>
+          <a:bodyPr/>
+          <a:lstStyle/>
+          <a:p>
+            <a:r>
+              <a:rPr lang="en-US" dirty="0" smtClean="0"/>
+              <a:t>Reasons for categorization</a:t>
+            </a:r>
+            <a:endParaRPr lang="en-US" dirty="0"/>
+          </a:p>
+        </p:txBody>
+      </p:sp>
+      <p:sp>
+        <p:nvSpPr>
+          <p:cNvPr id="3" name="Content Placeholder 2"/>
+          <p:cNvSpPr>
+            <a:spLocks noGrp="1"/>
+          </p:cNvSpPr>
+          <p:nvPr>
+            <p:ph idx="1"/>
+          </p:nvPr>
+        </p:nvSpPr>
+        <p:spPr/>
+        <p:txBody>
+          <a:bodyPr/>
+          <a:lstStyle/>
+          <a:p>
+            <a:r>
+              <a:rPr lang="en-US" dirty="0" smtClean="0"/>
+              <a:t>Feedback cycles</a:t>
+            </a:r>
+          </a:p>
+          <a:p>
+            <a:r>
+              <a:rPr lang="en-US" dirty="0" smtClean="0"/>
+              <a:t>Maintenance</a:t>
+            </a:r>
+          </a:p>
+          <a:p>
+            <a:endParaRPr lang="en-US" dirty="0" smtClean="0"/>
+          </a:p>
+          <a:p>
+            <a:r>
+              <a:rPr lang="en-US" dirty="0" smtClean="0"/>
+              <a:t>“The more units put into something the longer the feedback cycle and the less maintainable the test is”</a:t>
+            </a:r>
+            <a:endParaRPr lang="en-US" dirty="0"/>
+          </a:p>
+        </p:txBody>
+      </p:sp>
+    </p:spTree>
+  </p:cSld>
+  <p:clrMapOvr>
+    <a:masterClrMapping/>
+  </p:clrMapOvr>
+  <p:timing>
+    <p:tnLst>
+      <p:par>
+        <p:cTn id="1" dur="indefinite" restart="never" nodeType="tmRoot"/>
+      </p:par>
+    </p:tnLst>
+  </p:timing>
+</p:sld>
+</file>
+
+<file path=ppt/slides/slide17.xml><?xml version="1.0" encoding="utf-8"?>
+<p:sld xmlns:a="http://schemas.openxmlformats.org/drawingml/2006/main" xmlns:r="http://schemas.openxmlformats.org/officeDocument/2006/relationships" xmlns:p="http://schemas.openxmlformats.org/presentationml/2006/main">
+  <p:cSld>
+    <p:spTree>
+      <p:nvGrpSpPr>
+        <p:cNvPr id="1" name=""/>
+        <p:cNvGrpSpPr/>
+        <p:nvPr/>
+      </p:nvGrpSpPr>
+      <p:grpSpPr>
+        <a:xfrm>
+          <a:off x="0" y="0"/>
+          <a:ext cx="0" cy="0"/>
+          <a:chOff x="0" y="0"/>
+          <a:chExt cx="0" cy="0"/>
+        </a:xfrm>
+      </p:grpSpPr>
+      <p:sp>
+        <p:nvSpPr>
+          <p:cNvPr id="2" name="Title 1"/>
+          <p:cNvSpPr>
+            <a:spLocks noGrp="1"/>
+          </p:cNvSpPr>
+          <p:nvPr>
+            <p:ph type="title"/>
+          </p:nvPr>
+        </p:nvSpPr>
+        <p:spPr/>
+        <p:txBody>
+          <a:bodyPr/>
+          <a:lstStyle/>
+          <a:p>
+            <a:r>
+              <a:rPr lang="en-US" dirty="0" smtClean="0"/>
+              <a:t>Integration Testing</a:t>
+            </a:r>
+            <a:endParaRPr lang="en-US" dirty="0"/>
+          </a:p>
+        </p:txBody>
+      </p:sp>
+      <p:sp>
+        <p:nvSpPr>
+          <p:cNvPr id="3" name="Content Placeholder 2"/>
+          <p:cNvSpPr>
+            <a:spLocks noGrp="1"/>
+          </p:cNvSpPr>
+          <p:nvPr>
+            <p:ph idx="1"/>
+          </p:nvPr>
+        </p:nvSpPr>
+        <p:spPr/>
+        <p:txBody>
+          <a:bodyPr/>
+          <a:lstStyle/>
+          <a:p>
+            <a:endParaRPr lang="en-US"/>
+          </a:p>
+        </p:txBody>
+      </p:sp>
+    </p:spTree>
+  </p:cSld>
+  <p:clrMapOvr>
+    <a:masterClrMapping/>
+  </p:clrMapOvr>
+  <p:timing>
+    <p:tnLst>
+      <p:par>
+        <p:cTn id="1" dur="indefinite" restart="never" nodeType="tmRoot"/>
+      </p:par>
+    </p:tnLst>
+  </p:timing>
+</p:sld>
+</file>
+
+<file path=ppt/slides/slide18.xml><?xml version="1.0" encoding="utf-8"?>
+<p:sld xmlns:a="http://schemas.openxmlformats.org/drawingml/2006/main" xmlns:r="http://schemas.openxmlformats.org/officeDocument/2006/relationships" xmlns:p="http://schemas.openxmlformats.org/presentationml/2006/main">
+  <p:cSld>
+    <p:spTree>
+      <p:nvGrpSpPr>
+        <p:cNvPr id="1" name=""/>
+        <p:cNvGrpSpPr/>
+        <p:nvPr/>
+      </p:nvGrpSpPr>
+      <p:grpSpPr>
+        <a:xfrm>
+          <a:off x="0" y="0"/>
+          <a:ext cx="0" cy="0"/>
+          <a:chOff x="0" y="0"/>
+          <a:chExt cx="0" cy="0"/>
+        </a:xfrm>
+      </p:grpSpPr>
+      <p:sp>
+        <p:nvSpPr>
+          <p:cNvPr id="2" name="Title 1"/>
+          <p:cNvSpPr>
+            <a:spLocks noGrp="1"/>
+          </p:cNvSpPr>
+          <p:nvPr>
+            <p:ph type="title"/>
+          </p:nvPr>
+        </p:nvSpPr>
+        <p:spPr/>
+        <p:txBody>
+          <a:bodyPr/>
+          <a:lstStyle/>
+          <a:p>
+            <a:r>
+              <a:rPr lang="en-US" dirty="0" smtClean="0"/>
+              <a:t>Unit Testing</a:t>
+            </a:r>
+            <a:endParaRPr lang="en-US" dirty="0"/>
+          </a:p>
+        </p:txBody>
+      </p:sp>
+      <p:sp>
+        <p:nvSpPr>
+          <p:cNvPr id="3" name="Content Placeholder 2"/>
+          <p:cNvSpPr>
+            <a:spLocks noGrp="1"/>
+          </p:cNvSpPr>
+          <p:nvPr>
+            <p:ph idx="1"/>
+          </p:nvPr>
+        </p:nvSpPr>
+        <p:spPr/>
+        <p:txBody>
+          <a:bodyPr/>
+          <a:lstStyle/>
+          <a:p>
+            <a:r>
+              <a:rPr lang="en-US" dirty="0" smtClean="0"/>
+              <a:t>Test a “unit” of something</a:t>
+            </a:r>
+          </a:p>
+          <a:p>
+            <a:r>
+              <a:rPr lang="en-US" dirty="0" smtClean="0"/>
+              <a:t>But WTF is a unit?</a:t>
+            </a:r>
+          </a:p>
+          <a:p>
+            <a:pPr lvl="1"/>
+            <a:r>
+              <a:rPr lang="en-US" dirty="0" smtClean="0"/>
+              <a:t>A near religion around this</a:t>
+            </a:r>
+          </a:p>
+          <a:p>
+            <a:endParaRPr lang="en-US" dirty="0" smtClean="0"/>
+          </a:p>
+          <a:p>
+            <a:endParaRPr lang="en-US" dirty="0" smtClean="0"/>
+          </a:p>
+          <a:p>
+            <a:r>
+              <a:rPr lang="en-US" dirty="0" smtClean="0"/>
+              <a:t>For purposes of discussion a unit is one class / sometimes one method in code</a:t>
+            </a:r>
+          </a:p>
+        </p:txBody>
+      </p:sp>
+      <p:pic>
+        <p:nvPicPr>
+          <p:cNvPr id="9220" name="Picture 4" descr="Me Gusta"/>
           <p:cNvPicPr>
             <a:picLocks noChangeAspect="1" noChangeArrowheads="1"/>
           </p:cNvPicPr>
@@ -3591,21 +4802,93 @@
         </p:blipFill>
         <p:spPr bwMode="auto">
           <a:xfrm>
-            <a:off x="2438400" y="3733800"/>
-            <a:ext cx="3886200" cy="2781300"/>
+            <a:off x="5791200" y="1219200"/>
+            <a:ext cx="3181350" cy="3169781"/>
           </a:xfrm>
           <a:prstGeom prst="rect">
             <a:avLst/>
           </a:prstGeom>
           <a:noFill/>
-          <a:ln w="9525">
-            <a:noFill/>
-            <a:miter lim="800000"/>
-            <a:headEnd/>
-            <a:tailEnd/>
-          </a:ln>
         </p:spPr>
       </p:pic>
+    </p:spTree>
+  </p:cSld>
+  <p:clrMapOvr>
+    <a:masterClrMapping/>
+  </p:clrMapOvr>
+  <p:timing>
+    <p:tnLst>
+      <p:par>
+        <p:cTn id="1" dur="indefinite" restart="never" nodeType="tmRoot"/>
+      </p:par>
+    </p:tnLst>
+  </p:timing>
+</p:sld>
+</file>
+
+<file path=ppt/slides/slide19.xml><?xml version="1.0" encoding="utf-8"?>
+<p:sld xmlns:a="http://schemas.openxmlformats.org/drawingml/2006/main" xmlns:r="http://schemas.openxmlformats.org/officeDocument/2006/relationships" xmlns:p="http://schemas.openxmlformats.org/presentationml/2006/main">
+  <p:cSld>
+    <p:spTree>
+      <p:nvGrpSpPr>
+        <p:cNvPr id="1" name=""/>
+        <p:cNvGrpSpPr/>
+        <p:nvPr/>
+      </p:nvGrpSpPr>
+      <p:grpSpPr>
+        <a:xfrm>
+          <a:off x="0" y="0"/>
+          <a:ext cx="0" cy="0"/>
+          <a:chOff x="0" y="0"/>
+          <a:chExt cx="0" cy="0"/>
+        </a:xfrm>
+      </p:grpSpPr>
+      <p:sp>
+        <p:nvSpPr>
+          <p:cNvPr id="2" name="Title 1"/>
+          <p:cNvSpPr>
+            <a:spLocks noGrp="1"/>
+          </p:cNvSpPr>
+          <p:nvPr>
+            <p:ph type="title"/>
+          </p:nvPr>
+        </p:nvSpPr>
+        <p:spPr/>
+        <p:txBody>
+          <a:bodyPr/>
+          <a:lstStyle/>
+          <a:p>
+            <a:r>
+              <a:rPr lang="en-US" dirty="0" smtClean="0"/>
+              <a:t>Where does mocking come in?</a:t>
+            </a:r>
+            <a:endParaRPr lang="en-US" dirty="0"/>
+          </a:p>
+        </p:txBody>
+      </p:sp>
+      <p:sp>
+        <p:nvSpPr>
+          <p:cNvPr id="3" name="Content Placeholder 2"/>
+          <p:cNvSpPr>
+            <a:spLocks noGrp="1"/>
+          </p:cNvSpPr>
+          <p:nvPr>
+            <p:ph idx="1"/>
+          </p:nvPr>
+        </p:nvSpPr>
+        <p:spPr/>
+        <p:txBody>
+          <a:bodyPr/>
+          <a:lstStyle/>
+          <a:p>
+            <a:r>
+              <a:rPr lang="en-US" dirty="0" smtClean="0"/>
+              <a:t>Fakes, mocks, stubs – oh my!</a:t>
+            </a:r>
+            <a:endParaRPr lang="en-US" dirty="0"/>
+          </a:p>
+        </p:txBody>
+      </p:sp>
     </p:spTree>
   </p:cSld>
   <p:clrMapOvr>
@@ -3653,9 +4936,105 @@
           <a:bodyPr/>
           <a:lstStyle/>
           <a:p>
-            <a:r>
-              <a:rPr lang="en-US" dirty="0" smtClean="0"/>
-              <a:t>Who am I? Who cares…</a:t>
+            <a:endParaRPr lang="en-US"/>
+          </a:p>
+        </p:txBody>
+      </p:sp>
+      <p:sp>
+        <p:nvSpPr>
+          <p:cNvPr id="3" name="Content Placeholder 2"/>
+          <p:cNvSpPr>
+            <a:spLocks noGrp="1"/>
+          </p:cNvSpPr>
+          <p:nvPr>
+            <p:ph idx="1"/>
+          </p:nvPr>
+        </p:nvSpPr>
+        <p:spPr/>
+        <p:txBody>
+          <a:bodyPr/>
+          <a:lstStyle/>
+          <a:p>
+            <a:endParaRPr lang="en-US"/>
+          </a:p>
+        </p:txBody>
+      </p:sp>
+      <p:pic>
+        <p:nvPicPr>
+          <p:cNvPr id="1026" name="Picture 2" descr="C:\Users\robz\Downloads\SponsorSlide\SponsorSlide.001.png"/>
+          <p:cNvPicPr>
+            <a:picLocks noChangeAspect="1" noChangeArrowheads="1"/>
+          </p:cNvPicPr>
+          <p:nvPr/>
+        </p:nvPicPr>
+        <p:blipFill>
+          <a:blip r:embed="rId2" cstate="print"/>
+          <a:srcRect/>
+          <a:stretch>
+            <a:fillRect/>
+          </a:stretch>
+        </p:blipFill>
+        <p:spPr bwMode="auto">
+          <a:xfrm>
+            <a:off x="381000" y="285750"/>
+            <a:ext cx="8382000" cy="6286500"/>
+          </a:xfrm>
+          <a:prstGeom prst="rect">
+            <a:avLst/>
+          </a:prstGeom>
+          <a:noFill/>
+        </p:spPr>
+      </p:pic>
+    </p:spTree>
+  </p:cSld>
+  <p:clrMapOvr>
+    <a:masterClrMapping/>
+  </p:clrMapOvr>
+  <p:timing>
+    <p:tnLst>
+      <p:par>
+        <p:cTn id="1" dur="indefinite" restart="never" nodeType="tmRoot"/>
+      </p:par>
+    </p:tnLst>
+  </p:timing>
+</p:sld>
+</file>
+
+<file path=ppt/slides/slide20.xml><?xml version="1.0" encoding="utf-8"?>
+<p:sld xmlns:a="http://schemas.openxmlformats.org/drawingml/2006/main" xmlns:r="http://schemas.openxmlformats.org/officeDocument/2006/relationships" xmlns:p="http://schemas.openxmlformats.org/presentationml/2006/main">
+  <p:cSld>
+    <p:spTree>
+      <p:nvGrpSpPr>
+        <p:cNvPr id="1" name=""/>
+        <p:cNvGrpSpPr/>
+        <p:nvPr/>
+      </p:nvGrpSpPr>
+      <p:grpSpPr>
+        <a:xfrm>
+          <a:off x="0" y="0"/>
+          <a:ext cx="0" cy="0"/>
+          <a:chOff x="0" y="0"/>
+          <a:chExt cx="0" cy="0"/>
+        </a:xfrm>
+      </p:grpSpPr>
+      <p:sp>
+        <p:nvSpPr>
+          <p:cNvPr id="2" name="Title 1"/>
+          <p:cNvSpPr>
+            <a:spLocks noGrp="1"/>
+          </p:cNvSpPr>
+          <p:nvPr>
+            <p:ph type="title"/>
+          </p:nvPr>
+        </p:nvSpPr>
+        <p:spPr/>
+        <p:txBody>
+          <a:bodyPr/>
+          <a:lstStyle/>
+          <a:p>
+            <a:r>
+              <a:rPr lang="en-US" dirty="0" smtClean="0"/>
+              <a:t>Questions?</a:t>
             </a:r>
             <a:endParaRPr lang="en-US" dirty="0"/>
           </a:p>
@@ -3671,67 +5050,10 @@
             <p:ph idx="1"/>
           </p:nvPr>
         </p:nvSpPr>
-        <p:spPr>
-          <a:xfrm>
-            <a:off x="457200" y="1600200"/>
-            <a:ext cx="8229600" cy="4953000"/>
-          </a:xfrm>
-        </p:spPr>
-        <p:txBody>
-          <a:bodyPr>
-            <a:normAutofit lnSpcReduction="10000"/>
-          </a:bodyPr>
-          <a:lstStyle/>
-          <a:p>
-            <a:r>
-              <a:rPr lang="en-US" dirty="0" smtClean="0"/>
-              <a:t>Rob Reynolds</a:t>
-            </a:r>
-          </a:p>
-          <a:p>
-            <a:r>
-              <a:rPr lang="en-US" dirty="0" smtClean="0"/>
-              <a:t>Technical Lead for VML</a:t>
-            </a:r>
-          </a:p>
-          <a:p>
-            <a:r>
-              <a:rPr lang="en-US" dirty="0" smtClean="0"/>
-              <a:t>OSS</a:t>
-            </a:r>
-          </a:p>
-          <a:p>
-            <a:pPr lvl="1"/>
-            <a:r>
-              <a:rPr lang="en-US" dirty="0" smtClean="0"/>
-              <a:t>Chocolatey</a:t>
-            </a:r>
-          </a:p>
-          <a:p>
-            <a:pPr lvl="1"/>
-            <a:r>
-              <a:rPr lang="en-US" dirty="0" smtClean="0"/>
-              <a:t>Chuck Norris Framework</a:t>
-            </a:r>
-          </a:p>
-          <a:p>
-            <a:pPr lvl="1"/>
-            <a:r>
-              <a:rPr lang="en-US" dirty="0" err="1" smtClean="0"/>
-              <a:t>NuGet</a:t>
-            </a:r>
-            <a:r>
-              <a:rPr lang="en-US" dirty="0" smtClean="0"/>
-              <a:t> core team member</a:t>
-            </a:r>
-          </a:p>
-          <a:p>
-            <a:pPr lvl="1"/>
-            <a:r>
-              <a:rPr lang="en-US" dirty="0" smtClean="0"/>
-              <a:t>Various contributions to other projects</a:t>
-            </a:r>
-          </a:p>
+        <p:spPr/>
+        <p:txBody>
+          <a:bodyPr/>
+          <a:lstStyle/>
           <a:p>
             <a:r>
               <a:rPr lang="en-US" dirty="0" smtClean="0"/>
@@ -3743,22 +5065,99 @@
             </a:r>
             <a:r>
               <a:rPr lang="en-US" dirty="0" smtClean="0"/>
-              <a:t>, you name it</a:t>
-            </a:r>
-          </a:p>
-          <a:p>
-            <a:r>
-              <a:rPr lang="en-US" dirty="0" smtClean="0"/>
-              <a:t>ferventcoder.com / </a:t>
-            </a:r>
-            <a:r>
-              <a:rPr lang="en-US" dirty="0" err="1" smtClean="0"/>
-              <a:t>Devlicio.us</a:t>
-            </a:r>
-            <a:endParaRPr lang="en-US" dirty="0" smtClean="0"/>
-          </a:p>
-        </p:txBody>
-      </p:sp>
+              <a:t>, etc</a:t>
+            </a:r>
+          </a:p>
+          <a:p>
+            <a:r>
+              <a:rPr lang="en-US" dirty="0" smtClean="0"/>
+              <a:t>Pester – </a:t>
+            </a:r>
+            <a:r>
+              <a:rPr lang="en-US" dirty="0" smtClean="0">
+                <a:hlinkClick r:id="rId2"/>
+              </a:rPr>
+              <a:t>https://github.com/scottmuc/Pester#readme</a:t>
+            </a:r>
+            <a:r>
+              <a:rPr lang="en-US" dirty="0" smtClean="0"/>
+              <a:t> </a:t>
+            </a:r>
+          </a:p>
+          <a:p>
+            <a:r>
+              <a:rPr lang="en-US" dirty="0" smtClean="0"/>
+              <a:t>Chocolatey – </a:t>
+            </a:r>
+            <a:r>
+              <a:rPr lang="en-US" dirty="0" smtClean="0">
+                <a:hlinkClick r:id="rId3"/>
+              </a:rPr>
+              <a:t>http://chocolatey.org</a:t>
+            </a:r>
+            <a:endParaRPr lang="en-US" dirty="0"/>
+          </a:p>
+        </p:txBody>
+      </p:sp>
+    </p:spTree>
+  </p:cSld>
+  <p:clrMapOvr>
+    <a:masterClrMapping/>
+  </p:clrMapOvr>
+  <p:transition/>
+  <p:timing>
+    <p:tnLst>
+      <p:par>
+        <p:cTn id="1" dur="indefinite" restart="never" nodeType="tmRoot"/>
+      </p:par>
+    </p:tnLst>
+  </p:timing>
+</p:sld>
+</file>
+
+<file path=ppt/slides/slide21.xml><?xml version="1.0" encoding="utf-8"?>
+<p:sld xmlns:a="http://schemas.openxmlformats.org/drawingml/2006/main" xmlns:r="http://schemas.openxmlformats.org/officeDocument/2006/relationships" xmlns:p="http://schemas.openxmlformats.org/presentationml/2006/main">
+  <p:cSld>
+    <p:spTree>
+      <p:nvGrpSpPr>
+        <p:cNvPr id="1" name=""/>
+        <p:cNvGrpSpPr/>
+        <p:nvPr/>
+      </p:nvGrpSpPr>
+      <p:grpSpPr>
+        <a:xfrm>
+          <a:off x="0" y="0"/>
+          <a:ext cx="0" cy="0"/>
+          <a:chOff x="0" y="0"/>
+          <a:chExt cx="0" cy="0"/>
+        </a:xfrm>
+      </p:grpSpPr>
+      <p:pic>
+        <p:nvPicPr>
+          <p:cNvPr id="3074" name="Picture 2" descr="The Most Interesting Man In The World - I Don't always TesT, My Friends But When I do, it Sure as H--l isn't in PowerShell"/>
+          <p:cNvPicPr>
+            <a:picLocks noChangeAspect="1" noChangeArrowheads="1"/>
+          </p:cNvPicPr>
+          <p:nvPr/>
+        </p:nvPicPr>
+        <p:blipFill>
+          <a:blip r:embed="rId2" cstate="print"/>
+          <a:srcRect/>
+          <a:stretch>
+            <a:fillRect/>
+          </a:stretch>
+        </p:blipFill>
+        <p:spPr bwMode="auto">
+          <a:xfrm>
+            <a:off x="2667000" y="1042988"/>
+            <a:ext cx="3810000" cy="4772025"/>
+          </a:xfrm>
+          <a:prstGeom prst="rect">
+            <a:avLst/>
+          </a:prstGeom>
+          <a:noFill/>
+        </p:spPr>
+      </p:pic>
     </p:spTree>
   </p:cSld>
   <p:clrMapOvr>
@@ -3808,7 +5207,7 @@
           <a:p>
             <a:r>
               <a:rPr lang="en-US" dirty="0" smtClean="0"/>
-              <a:t>Topics</a:t>
+              <a:t>Who am I? Who cares…</a:t>
             </a:r>
             <a:endParaRPr lang="en-US" dirty="0"/>
           </a:p>
@@ -3824,64 +5223,92 @@
             <p:ph idx="1"/>
           </p:nvPr>
         </p:nvSpPr>
-        <p:spPr/>
+        <p:spPr>
+          <a:xfrm>
+            <a:off x="457200" y="1600200"/>
+            <a:ext cx="8229600" cy="4953000"/>
+          </a:xfrm>
+        </p:spPr>
         <p:txBody>
           <a:bodyPr>
-            <a:normAutofit/>
+            <a:normAutofit lnSpcReduction="10000"/>
           </a:bodyPr>
           <a:lstStyle/>
           <a:p>
             <a:r>
               <a:rPr lang="en-US" dirty="0" smtClean="0"/>
-              <a:t>Automated Testing… </a:t>
+              <a:t>Rob Reynolds</a:t>
+            </a:r>
+          </a:p>
+          <a:p>
+            <a:r>
+              <a:rPr lang="en-US" dirty="0" smtClean="0"/>
+              <a:t>Technical Lead for VML</a:t>
+            </a:r>
+          </a:p>
+          <a:p>
+            <a:r>
+              <a:rPr lang="en-US" dirty="0" smtClean="0"/>
+              <a:t>OSS</a:t>
             </a:r>
           </a:p>
           <a:p>
             <a:pPr lvl="1"/>
             <a:r>
               <a:rPr lang="en-US" dirty="0" smtClean="0"/>
-              <a:t>Integration Testing</a:t>
-            </a:r>
+              <a:t>Chocolatey / Chuck Norris Framework / </a:t>
+            </a:r>
+            <a:r>
+              <a:rPr lang="en-US" dirty="0" err="1" smtClean="0"/>
+              <a:t>NuGet</a:t>
+            </a:r>
+            <a:endParaRPr lang="en-US" dirty="0" smtClean="0"/>
           </a:p>
           <a:p>
             <a:pPr lvl="1"/>
             <a:r>
               <a:rPr lang="en-US" dirty="0" smtClean="0"/>
-              <a:t>Mocking</a:t>
-            </a:r>
-          </a:p>
-          <a:p>
-            <a:pPr lvl="1"/>
-            <a:r>
-              <a:rPr lang="en-US" dirty="0" smtClean="0"/>
-              <a:t>Unit Testing</a:t>
-            </a:r>
-          </a:p>
-          <a:p>
-            <a:r>
-              <a:rPr lang="en-US" dirty="0" smtClean="0"/>
-              <a:t>Behavior Driven Development</a:t>
-            </a:r>
-          </a:p>
-          <a:p>
-            <a:pPr lvl="1"/>
-            <a:r>
-              <a:rPr lang="en-US" dirty="0" smtClean="0"/>
-              <a:t>What does it all mean?</a:t>
-            </a:r>
-          </a:p>
-          <a:p>
-            <a:r>
-              <a:rPr lang="en-US" dirty="0" smtClean="0"/>
-              <a:t>..but like for PowerShell?</a:t>
-            </a:r>
-          </a:p>
-          <a:p>
-            <a:pPr lvl="1"/>
-            <a:r>
-              <a:rPr lang="en-US" dirty="0" smtClean="0"/>
-              <a:t>Pester</a:t>
-            </a:r>
+              <a:t>Various </a:t>
+            </a:r>
+            <a:r>
+              <a:rPr lang="en-US" dirty="0" smtClean="0"/>
+              <a:t>contributions to other projects</a:t>
+            </a:r>
+          </a:p>
+          <a:p>
+            <a:r>
+              <a:rPr lang="en-US" dirty="0" smtClean="0"/>
+              <a:t>ferventcoder – twitter, </a:t>
+            </a:r>
+            <a:r>
+              <a:rPr lang="en-US" dirty="0" err="1" smtClean="0"/>
+              <a:t>gmail</a:t>
+            </a:r>
+            <a:r>
+              <a:rPr lang="en-US" dirty="0" smtClean="0"/>
+              <a:t>, you name it</a:t>
+            </a:r>
+          </a:p>
+          <a:p>
+            <a:r>
+              <a:rPr lang="en-US" dirty="0" smtClean="0"/>
+              <a:t>ferventcoder.com / </a:t>
+            </a:r>
+            <a:r>
+              <a:rPr lang="en-US" dirty="0" err="1" smtClean="0"/>
+              <a:t>Devlicio.us</a:t>
+            </a:r>
+            <a:endParaRPr lang="en-US" dirty="0" smtClean="0"/>
+          </a:p>
+          <a:p>
+            <a:endParaRPr lang="en-US" dirty="0" smtClean="0"/>
+          </a:p>
+          <a:p>
+            <a:r>
+              <a:rPr lang="en-US" dirty="0" smtClean="0"/>
+              <a:t>Automated Testing for 8 years</a:t>
+            </a:r>
+            <a:endParaRPr lang="en-US" dirty="0" smtClean="0"/>
           </a:p>
         </p:txBody>
       </p:sp>
@@ -3932,7 +5359,11 @@
           <a:bodyPr/>
           <a:lstStyle/>
           <a:p>
-            <a:endParaRPr lang="en-US"/>
+            <a:r>
+              <a:rPr lang="en-US" dirty="0" smtClean="0"/>
+              <a:t>Topics                                d</a:t>
+            </a:r>
+            <a:endParaRPr lang="en-US" dirty="0"/>
           </a:p>
         </p:txBody>
       </p:sp>
@@ -3948,18 +5379,115 @@
         </p:nvSpPr>
         <p:spPr/>
         <p:txBody>
-          <a:bodyPr/>
-          <a:lstStyle/>
-          <a:p>
-            <a:endParaRPr lang="en-US"/>
-          </a:p>
-        </p:txBody>
-      </p:sp>
+          <a:bodyPr>
+            <a:normAutofit lnSpcReduction="10000"/>
+          </a:bodyPr>
+          <a:lstStyle/>
+          <a:p>
+            <a:r>
+              <a:rPr lang="en-US" dirty="0" smtClean="0"/>
+              <a:t>Automated Testing… </a:t>
+            </a:r>
+          </a:p>
+          <a:p>
+            <a:pPr lvl="1"/>
+            <a:r>
+              <a:rPr lang="en-US" dirty="0" smtClean="0"/>
+              <a:t>Integration Testing</a:t>
+            </a:r>
+          </a:p>
+          <a:p>
+            <a:pPr lvl="1"/>
+            <a:r>
+              <a:rPr lang="en-US" dirty="0" smtClean="0"/>
+              <a:t>Mocking</a:t>
+            </a:r>
+          </a:p>
+          <a:p>
+            <a:pPr lvl="1"/>
+            <a:r>
+              <a:rPr lang="en-US" dirty="0" smtClean="0"/>
+              <a:t>Unit Testing</a:t>
+            </a:r>
+          </a:p>
+          <a:p>
+            <a:r>
+              <a:rPr lang="en-US" dirty="0" smtClean="0"/>
+              <a:t>Behavior Driven </a:t>
+            </a:r>
+            <a:r>
+              <a:rPr lang="en-US" dirty="0" smtClean="0"/>
+              <a:t/>
+            </a:r>
+            <a:br>
+              <a:rPr lang="en-US" dirty="0" smtClean="0"/>
+            </a:br>
+            <a:r>
+              <a:rPr lang="en-US" dirty="0" smtClean="0"/>
+              <a:t>Development</a:t>
+            </a:r>
+            <a:endParaRPr lang="en-US" dirty="0" smtClean="0"/>
+          </a:p>
+          <a:p>
+            <a:pPr lvl="1"/>
+            <a:r>
+              <a:rPr lang="en-US" dirty="0" smtClean="0"/>
+              <a:t>What does it all mean?</a:t>
+            </a:r>
+          </a:p>
+          <a:p>
+            <a:r>
+              <a:rPr lang="en-US" dirty="0" smtClean="0"/>
+              <a:t>..but like for PowerShell?</a:t>
+            </a:r>
+          </a:p>
+          <a:p>
+            <a:pPr lvl="1"/>
+            <a:r>
+              <a:rPr lang="en-US" dirty="0" smtClean="0"/>
+              <a:t>Pester</a:t>
+            </a:r>
+          </a:p>
+        </p:txBody>
+      </p:sp>
+      <p:pic>
+        <p:nvPicPr>
+          <p:cNvPr id="4" name="Picture 2" descr="Inception"/>
+          <p:cNvPicPr>
+            <a:picLocks noChangeAspect="1" noChangeArrowheads="1"/>
+          </p:cNvPicPr>
+          <p:nvPr/>
+        </p:nvPicPr>
+        <p:blipFill>
+          <a:blip r:embed="rId2" cstate="print"/>
+          <a:srcRect/>
+          <a:stretch>
+            <a:fillRect/>
+          </a:stretch>
+        </p:blipFill>
+        <p:spPr bwMode="auto">
+          <a:xfrm>
+            <a:off x="4984751" y="0"/>
+            <a:ext cx="4159250" cy="6858000"/>
+          </a:xfrm>
+          <a:prstGeom prst="rect">
+            <a:avLst/>
+          </a:prstGeom>
+          <a:noFill/>
+        </p:spPr>
+      </p:pic>
     </p:spTree>
   </p:cSld>
   <p:clrMapOvr>
     <a:masterClrMapping/>
   </p:clrMapOvr>
+  <p:timing>
+    <p:tnLst>
+      <p:par>
+        <p:cTn id="1" dur="indefinite" restart="never" nodeType="tmRoot"/>
+      </p:par>
+    </p:tnLst>
+  </p:timing>
 </p:sld>
 </file>
 
@@ -4002,7 +5530,7 @@
           <a:p>
             <a:r>
               <a:rPr lang="en-US" dirty="0" smtClean="0"/>
-              <a:t>Some words</a:t>
+              <a:t>Back to Basics</a:t>
             </a:r>
             <a:endParaRPr lang="en-US" dirty="0"/>
           </a:p>
@@ -4057,7 +5585,7 @@
           <a:p>
             <a:r>
               <a:rPr lang="en-US" dirty="0" smtClean="0"/>
-              <a:t>Questions?</a:t>
+              <a:t>Test Automation</a:t>
             </a:r>
             <a:endParaRPr lang="en-US" dirty="0"/>
           </a:p>
@@ -4075,59 +5603,58 @@
         </p:nvSpPr>
         <p:spPr/>
         <p:txBody>
-          <a:bodyPr/>
-          <a:lstStyle/>
-          <a:p>
-            <a:r>
-              <a:rPr lang="en-US" dirty="0" smtClean="0"/>
-              <a:t>ferventcoder – twitter, </a:t>
-            </a:r>
-            <a:r>
-              <a:rPr lang="en-US" dirty="0" err="1" smtClean="0"/>
-              <a:t>gmail</a:t>
-            </a:r>
-            <a:r>
-              <a:rPr lang="en-US" dirty="0" smtClean="0"/>
-              <a:t>, etc</a:t>
-            </a:r>
-          </a:p>
-          <a:p>
-            <a:r>
-              <a:rPr lang="en-US" dirty="0" smtClean="0"/>
-              <a:t>Pester – </a:t>
+          <a:bodyPr>
+            <a:normAutofit lnSpcReduction="10000"/>
+          </a:bodyPr>
+          <a:lstStyle/>
+          <a:p>
+            <a:r>
+              <a:rPr lang="en-US" b="1" dirty="0" smtClean="0"/>
+              <a:t>Test automation</a:t>
+            </a:r>
+            <a:r>
+              <a:rPr lang="en-US" dirty="0" smtClean="0"/>
+              <a:t> is the use of </a:t>
             </a:r>
             <a:r>
               <a:rPr lang="en-US" dirty="0" smtClean="0">
-                <a:hlinkClick r:id="rId2"/>
+                <a:hlinkClick r:id="rId2" tooltip="Software"/>
               </a:rPr>
-              <a:t>https://</a:t>
+              <a:t>software</a:t>
+            </a:r>
+            <a:r>
+              <a:rPr lang="en-US" dirty="0" smtClean="0"/>
+              <a:t> to control the execution of </a:t>
             </a:r>
             <a:r>
               <a:rPr lang="en-US" dirty="0" smtClean="0">
-                <a:hlinkClick r:id="rId2"/>
+                <a:hlinkClick r:id="rId3" tooltip="Software testing"/>
               </a:rPr>
-              <a:t>github.com/scottmuc/Pester#readme</a:t>
-            </a:r>
-            <a:r>
-              <a:rPr lang="en-US" dirty="0" smtClean="0"/>
-              <a:t> </a:t>
-            </a:r>
-            <a:endParaRPr lang="en-US" dirty="0" smtClean="0"/>
-          </a:p>
-          <a:p>
-            <a:r>
-              <a:rPr lang="en-US" dirty="0" smtClean="0"/>
-              <a:t>Chocolatey </a:t>
-            </a:r>
-            <a:r>
-              <a:rPr lang="en-US" dirty="0" smtClean="0"/>
-              <a:t>– </a:t>
-            </a:r>
-            <a:r>
-              <a:rPr lang="en-US" dirty="0" smtClean="0">
-                <a:hlinkClick r:id="rId3"/>
+              <a:t>tests</a:t>
+            </a:r>
+            <a:r>
+              <a:rPr lang="en-US" dirty="0" smtClean="0"/>
+              <a:t>, the comparison of actual outcomes to predicted outcomes, the setting up of test preconditions, and other test control and test reporting functions.</a:t>
+            </a:r>
+            <a:r>
+              <a:rPr lang="en-US" baseline="30000" dirty="0" smtClean="0">
+                <a:hlinkClick r:id="rId4"/>
               </a:rPr>
-              <a:t>http://chocolatey.org</a:t>
+              <a:t>[1]</a:t>
+            </a:r>
+            <a:r>
+              <a:rPr lang="en-US" dirty="0" smtClean="0"/>
+              <a:t> Commonly, test automation involves automating a manual process already in place that uses a formalized testing process</a:t>
+            </a:r>
+            <a:r>
+              <a:rPr lang="en-US" dirty="0" smtClean="0"/>
+              <a:t>.</a:t>
+            </a:r>
+          </a:p>
+          <a:p>
+            <a:r>
+              <a:rPr lang="en-US" dirty="0" smtClean="0"/>
+              <a:t>-Wikipedia</a:t>
             </a:r>
             <a:endParaRPr lang="en-US" dirty="0"/>
           </a:p>
@@ -4138,7 +5665,238 @@
   <p:clrMapOvr>
     <a:masterClrMapping/>
   </p:clrMapOvr>
-  <p:transition/>
+  <p:timing>
+    <p:tnLst>
+      <p:par>
+        <p:cTn id="1" dur="indefinite" restart="never" nodeType="tmRoot"/>
+      </p:par>
+    </p:tnLst>
+  </p:timing>
+</p:sld>
+</file>
+
+<file path=ppt/slides/slide7.xml><?xml version="1.0" encoding="utf-8"?>
+<p:sld xmlns:a="http://schemas.openxmlformats.org/drawingml/2006/main" xmlns:r="http://schemas.openxmlformats.org/officeDocument/2006/relationships" xmlns:p="http://schemas.openxmlformats.org/presentationml/2006/main">
+  <p:cSld>
+    <p:spTree>
+      <p:nvGrpSpPr>
+        <p:cNvPr id="1" name=""/>
+        <p:cNvGrpSpPr/>
+        <p:nvPr/>
+      </p:nvGrpSpPr>
+      <p:grpSpPr>
+        <a:xfrm>
+          <a:off x="0" y="0"/>
+          <a:ext cx="0" cy="0"/>
+          <a:chOff x="0" y="0"/>
+          <a:chExt cx="0" cy="0"/>
+        </a:xfrm>
+      </p:grpSpPr>
+      <p:sp>
+        <p:nvSpPr>
+          <p:cNvPr id="2" name="Title 1"/>
+          <p:cNvSpPr>
+            <a:spLocks noGrp="1"/>
+          </p:cNvSpPr>
+          <p:nvPr>
+            <p:ph type="title"/>
+          </p:nvPr>
+        </p:nvSpPr>
+        <p:spPr/>
+        <p:txBody>
+          <a:bodyPr/>
+          <a:lstStyle/>
+          <a:p>
+            <a:r>
+              <a:rPr lang="en-US" dirty="0" smtClean="0"/>
+              <a:t>So what is test automation?</a:t>
+            </a:r>
+            <a:endParaRPr lang="en-US" dirty="0"/>
+          </a:p>
+        </p:txBody>
+      </p:sp>
+      <p:sp>
+        <p:nvSpPr>
+          <p:cNvPr id="3" name="Content Placeholder 2"/>
+          <p:cNvSpPr>
+            <a:spLocks noGrp="1"/>
+          </p:cNvSpPr>
+          <p:nvPr>
+            <p:ph idx="1"/>
+          </p:nvPr>
+        </p:nvSpPr>
+        <p:spPr/>
+        <p:txBody>
+          <a:bodyPr/>
+          <a:lstStyle/>
+          <a:p>
+            <a:r>
+              <a:rPr lang="en-US" dirty="0" smtClean="0"/>
+              <a:t>Making executable tests to determine your software works appropriately</a:t>
+            </a:r>
+          </a:p>
+        </p:txBody>
+      </p:sp>
+    </p:spTree>
+  </p:cSld>
+  <p:clrMapOvr>
+    <a:masterClrMapping/>
+  </p:clrMapOvr>
+  <p:timing>
+    <p:tnLst>
+      <p:par>
+        <p:cTn id="1" dur="indefinite" restart="never" nodeType="tmRoot"/>
+      </p:par>
+    </p:tnLst>
+  </p:timing>
+</p:sld>
+</file>
+
+<file path=ppt/slides/slide8.xml><?xml version="1.0" encoding="utf-8"?>
+<p:sld xmlns:a="http://schemas.openxmlformats.org/drawingml/2006/main" xmlns:r="http://schemas.openxmlformats.org/officeDocument/2006/relationships" xmlns:p="http://schemas.openxmlformats.org/presentationml/2006/main">
+  <p:cSld>
+    <p:spTree>
+      <p:nvGrpSpPr>
+        <p:cNvPr id="1" name=""/>
+        <p:cNvGrpSpPr/>
+        <p:nvPr/>
+      </p:nvGrpSpPr>
+      <p:grpSpPr>
+        <a:xfrm>
+          <a:off x="0" y="0"/>
+          <a:ext cx="0" cy="0"/>
+          <a:chOff x="0" y="0"/>
+          <a:chExt cx="0" cy="0"/>
+        </a:xfrm>
+      </p:grpSpPr>
+      <p:sp>
+        <p:nvSpPr>
+          <p:cNvPr id="2" name="Title 1"/>
+          <p:cNvSpPr>
+            <a:spLocks noGrp="1"/>
+          </p:cNvSpPr>
+          <p:nvPr>
+            <p:ph type="title"/>
+          </p:nvPr>
+        </p:nvSpPr>
+        <p:spPr/>
+        <p:txBody>
+          <a:bodyPr>
+            <a:normAutofit/>
+          </a:bodyPr>
+          <a:lstStyle/>
+          <a:p>
+            <a:r>
+              <a:rPr lang="en-US" dirty="0" smtClean="0"/>
+              <a:t>Fallacies of automated testing</a:t>
+            </a:r>
+            <a:endParaRPr lang="en-US" dirty="0"/>
+          </a:p>
+        </p:txBody>
+      </p:sp>
+      <p:sp>
+        <p:nvSpPr>
+          <p:cNvPr id="3" name="Content Placeholder 2"/>
+          <p:cNvSpPr>
+            <a:spLocks noGrp="1"/>
+          </p:cNvSpPr>
+          <p:nvPr>
+            <p:ph idx="1"/>
+          </p:nvPr>
+        </p:nvSpPr>
+        <p:spPr/>
+        <p:txBody>
+          <a:bodyPr/>
+          <a:lstStyle/>
+          <a:p>
+            <a:r>
+              <a:rPr lang="en-US" dirty="0" smtClean="0"/>
+              <a:t>“Automated tests will prove the absence of bugs”</a:t>
+            </a:r>
+          </a:p>
+          <a:p>
+            <a:r>
+              <a:rPr lang="en-US" dirty="0" smtClean="0"/>
+              <a:t>“’Unit’ testing is easy”</a:t>
+            </a:r>
+          </a:p>
+          <a:p>
+            <a:r>
+              <a:rPr lang="en-US" dirty="0" smtClean="0"/>
+              <a:t>“One class – one test class”</a:t>
+            </a:r>
+          </a:p>
+          <a:p>
+            <a:r>
+              <a:rPr lang="en-US" dirty="0" smtClean="0"/>
+              <a:t>“Testing takes little time”</a:t>
+            </a:r>
+          </a:p>
+        </p:txBody>
+      </p:sp>
+    </p:spTree>
+  </p:cSld>
+  <p:clrMapOvr>
+    <a:masterClrMapping/>
+  </p:clrMapOvr>
+  <p:timing>
+    <p:tnLst>
+      <p:par>
+        <p:cTn id="1" dur="indefinite" restart="never" nodeType="tmRoot"/>
+      </p:par>
+    </p:tnLst>
+  </p:timing>
+</p:sld>
+</file>
+
+<file path=ppt/slides/slide9.xml><?xml version="1.0" encoding="utf-8"?>
+<p:sld xmlns:a="http://schemas.openxmlformats.org/drawingml/2006/main" xmlns:r="http://schemas.openxmlformats.org/officeDocument/2006/relationships" xmlns:p="http://schemas.openxmlformats.org/presentationml/2006/main">
+  <p:cSld>
+    <p:spTree>
+      <p:nvGrpSpPr>
+        <p:cNvPr id="1" name=""/>
+        <p:cNvGrpSpPr/>
+        <p:nvPr/>
+      </p:nvGrpSpPr>
+      <p:grpSpPr>
+        <a:xfrm>
+          <a:off x="0" y="0"/>
+          <a:ext cx="0" cy="0"/>
+          <a:chOff x="0" y="0"/>
+          <a:chExt cx="0" cy="0"/>
+        </a:xfrm>
+      </p:grpSpPr>
+      <p:pic>
+        <p:nvPicPr>
+          <p:cNvPr id="38916" name="Picture 4" descr="Velociraptor Xd - SO WHY WOULD I WANT TO TEST?"/>
+          <p:cNvPicPr>
+            <a:picLocks noChangeAspect="1" noChangeArrowheads="1"/>
+          </p:cNvPicPr>
+          <p:nvPr/>
+        </p:nvPicPr>
+        <p:blipFill>
+          <a:blip r:embed="rId2" cstate="print"/>
+          <a:srcRect/>
+          <a:stretch>
+            <a:fillRect/>
+          </a:stretch>
+        </p:blipFill>
+        <p:spPr bwMode="auto">
+          <a:xfrm>
+            <a:off x="2667000" y="1524000"/>
+            <a:ext cx="3810000" cy="3810000"/>
+          </a:xfrm>
+          <a:prstGeom prst="rect">
+            <a:avLst/>
+          </a:prstGeom>
+          <a:noFill/>
+        </p:spPr>
+      </p:pic>
+    </p:spTree>
+  </p:cSld>
+  <p:clrMapOvr>
+    <a:masterClrMapping/>
+  </p:clrMapOvr>
   <p:timing>
     <p:tnLst>
       <p:par>

</xml_diff>

<commit_message>
adding more about bdd
</commit_message>
<xml_diff>
--- a/dotNet/powershellbdd/AutomatedTestingForPowerShell.pptx
+++ b/dotNet/powershellbdd/AutomatedTestingForPowerShell.pptx
@@ -5,7 +5,7 @@
     <p:sldMasterId id="2147483756" r:id="rId1"/>
   </p:sldMasterIdLst>
   <p:notesMasterIdLst>
-    <p:notesMasterId r:id="rId34"/>
+    <p:notesMasterId r:id="rId36"/>
   </p:notesMasterIdLst>
   <p:sldIdLst>
     <p:sldId id="256" r:id="rId2"/>
@@ -23,23 +23,25 @@
     <p:sldId id="338" r:id="rId14"/>
     <p:sldId id="340" r:id="rId15"/>
     <p:sldId id="336" r:id="rId16"/>
-    <p:sldId id="339" r:id="rId17"/>
-    <p:sldId id="335" r:id="rId18"/>
-    <p:sldId id="349" r:id="rId19"/>
-    <p:sldId id="351" r:id="rId20"/>
-    <p:sldId id="352" r:id="rId21"/>
-    <p:sldId id="354" r:id="rId22"/>
-    <p:sldId id="353" r:id="rId23"/>
-    <p:sldId id="337" r:id="rId24"/>
-    <p:sldId id="357" r:id="rId25"/>
+    <p:sldId id="335" r:id="rId17"/>
+    <p:sldId id="349" r:id="rId18"/>
+    <p:sldId id="351" r:id="rId19"/>
+    <p:sldId id="352" r:id="rId20"/>
+    <p:sldId id="354" r:id="rId21"/>
+    <p:sldId id="353" r:id="rId22"/>
+    <p:sldId id="337" r:id="rId23"/>
+    <p:sldId id="357" r:id="rId24"/>
+    <p:sldId id="365" r:id="rId25"/>
     <p:sldId id="355" r:id="rId26"/>
     <p:sldId id="356" r:id="rId27"/>
     <p:sldId id="362" r:id="rId28"/>
-    <p:sldId id="358" r:id="rId29"/>
-    <p:sldId id="359" r:id="rId30"/>
-    <p:sldId id="361" r:id="rId31"/>
-    <p:sldId id="297" r:id="rId32"/>
-    <p:sldId id="341" r:id="rId33"/>
+    <p:sldId id="363" r:id="rId29"/>
+    <p:sldId id="358" r:id="rId30"/>
+    <p:sldId id="359" r:id="rId31"/>
+    <p:sldId id="361" r:id="rId32"/>
+    <p:sldId id="364" r:id="rId33"/>
+    <p:sldId id="297" r:id="rId34"/>
+    <p:sldId id="341" r:id="rId35"/>
   </p:sldIdLst>
   <p:sldSz cx="9144000" cy="6858000" type="screen4x3"/>
   <p:notesSz cx="6858000" cy="9144000"/>
@@ -224,7 +226,7 @@
             <a:fld id="{F8705BBE-BC03-42F3-A30B-8ED0F940BFAD}" type="datetimeFigureOut">
               <a:rPr lang="en-US" smtClean="0"/>
               <a:pPr/>
-              <a:t>4/27/2012</a:t>
+              <a:t>4/28/2012</a:t>
             </a:fld>
             <a:endParaRPr lang="en-US"/>
           </a:p>
@@ -846,7 +848,7 @@
             <a:fld id="{C3CE9471-DEB6-4DE0-B19C-141FBC909CBF}" type="datetimeFigureOut">
               <a:rPr lang="en-US" smtClean="0"/>
               <a:pPr/>
-              <a:t>4/27/2012</a:t>
+              <a:t>4/28/2012</a:t>
             </a:fld>
             <a:endParaRPr lang="en-US"/>
           </a:p>
@@ -1013,7 +1015,7 @@
             <a:fld id="{C3CE9471-DEB6-4DE0-B19C-141FBC909CBF}" type="datetimeFigureOut">
               <a:rPr lang="en-US" smtClean="0"/>
               <a:pPr/>
-              <a:t>4/27/2012</a:t>
+              <a:t>4/28/2012</a:t>
             </a:fld>
             <a:endParaRPr lang="en-US"/>
           </a:p>
@@ -1190,7 +1192,7 @@
             <a:fld id="{C3CE9471-DEB6-4DE0-B19C-141FBC909CBF}" type="datetimeFigureOut">
               <a:rPr lang="en-US" smtClean="0"/>
               <a:pPr/>
-              <a:t>4/27/2012</a:t>
+              <a:t>4/28/2012</a:t>
             </a:fld>
             <a:endParaRPr lang="en-US"/>
           </a:p>
@@ -1357,7 +1359,7 @@
             <a:fld id="{C3CE9471-DEB6-4DE0-B19C-141FBC909CBF}" type="datetimeFigureOut">
               <a:rPr lang="en-US" smtClean="0"/>
               <a:pPr/>
-              <a:t>4/27/2012</a:t>
+              <a:t>4/28/2012</a:t>
             </a:fld>
             <a:endParaRPr lang="en-US"/>
           </a:p>
@@ -1600,7 +1602,7 @@
             <a:fld id="{C3CE9471-DEB6-4DE0-B19C-141FBC909CBF}" type="datetimeFigureOut">
               <a:rPr lang="en-US" smtClean="0"/>
               <a:pPr/>
-              <a:t>4/27/2012</a:t>
+              <a:t>4/28/2012</a:t>
             </a:fld>
             <a:endParaRPr lang="en-US"/>
           </a:p>
@@ -1885,7 +1887,7 @@
             <a:fld id="{C3CE9471-DEB6-4DE0-B19C-141FBC909CBF}" type="datetimeFigureOut">
               <a:rPr lang="en-US" smtClean="0"/>
               <a:pPr/>
-              <a:t>4/27/2012</a:t>
+              <a:t>4/28/2012</a:t>
             </a:fld>
             <a:endParaRPr lang="en-US"/>
           </a:p>
@@ -2304,7 +2306,7 @@
             <a:fld id="{C3CE9471-DEB6-4DE0-B19C-141FBC909CBF}" type="datetimeFigureOut">
               <a:rPr lang="en-US" smtClean="0"/>
               <a:pPr/>
-              <a:t>4/27/2012</a:t>
+              <a:t>4/28/2012</a:t>
             </a:fld>
             <a:endParaRPr lang="en-US"/>
           </a:p>
@@ -2419,7 +2421,7 @@
             <a:fld id="{C3CE9471-DEB6-4DE0-B19C-141FBC909CBF}" type="datetimeFigureOut">
               <a:rPr lang="en-US" smtClean="0"/>
               <a:pPr/>
-              <a:t>4/27/2012</a:t>
+              <a:t>4/28/2012</a:t>
             </a:fld>
             <a:endParaRPr lang="en-US"/>
           </a:p>
@@ -2511,7 +2513,7 @@
             <a:fld id="{C3CE9471-DEB6-4DE0-B19C-141FBC909CBF}" type="datetimeFigureOut">
               <a:rPr lang="en-US" smtClean="0"/>
               <a:pPr/>
-              <a:t>4/27/2012</a:t>
+              <a:t>4/28/2012</a:t>
             </a:fld>
             <a:endParaRPr lang="en-US"/>
           </a:p>
@@ -2785,7 +2787,7 @@
             <a:fld id="{C3CE9471-DEB6-4DE0-B19C-141FBC909CBF}" type="datetimeFigureOut">
               <a:rPr lang="en-US" smtClean="0"/>
               <a:pPr/>
-              <a:t>4/27/2012</a:t>
+              <a:t>4/28/2012</a:t>
             </a:fld>
             <a:endParaRPr lang="en-US"/>
           </a:p>
@@ -3039,7 +3041,7 @@
             <a:fld id="{C3CE9471-DEB6-4DE0-B19C-141FBC909CBF}" type="datetimeFigureOut">
               <a:rPr lang="en-US" smtClean="0"/>
               <a:pPr/>
-              <a:t>4/27/2012</a:t>
+              <a:t>4/28/2012</a:t>
             </a:fld>
             <a:endParaRPr lang="en-US"/>
           </a:p>
@@ -3249,7 +3251,7 @@
             <a:fld id="{C3CE9471-DEB6-4DE0-B19C-141FBC909CBF}" type="datetimeFigureOut">
               <a:rPr lang="en-US" smtClean="0"/>
               <a:pPr/>
-              <a:t>4/27/2012</a:t>
+              <a:t>4/28/2012</a:t>
             </a:fld>
             <a:endParaRPr lang="en-US"/>
           </a:p>
@@ -3796,34 +3798,14 @@
           <a:p>
             <a:r>
               <a:rPr lang="en-US" dirty="0" smtClean="0"/>
-              <a:t>“We never touch that piece of </a:t>
-            </a:r>
-            <a:r>
-              <a:rPr lang="en-US" dirty="0" smtClean="0"/>
-              <a:t>code. A guy wrote it a long time ago and he’s not here anymore. It </a:t>
-            </a:r>
-            <a:r>
-              <a:rPr lang="en-US" dirty="0" smtClean="0"/>
-              <a:t>just </a:t>
-            </a:r>
-            <a:r>
-              <a:rPr lang="en-US" dirty="0" smtClean="0"/>
-              <a:t>works.” </a:t>
+              <a:t>“We never touch that piece of code. A guy wrote it a long time ago and he’s not here anymore. It just works.” </a:t>
             </a:r>
           </a:p>
           <a:p>
             <a:pPr lvl="1"/>
             <a:r>
               <a:rPr lang="en-US" dirty="0" smtClean="0"/>
-              <a:t>Translation </a:t>
-            </a:r>
-            <a:r>
-              <a:rPr lang="en-US" dirty="0" smtClean="0"/>
-              <a:t>“We have no idea WTF it does and have no test automation on it to help us figure it out</a:t>
-            </a:r>
-            <a:r>
-              <a:rPr lang="en-US" dirty="0" smtClean="0"/>
-              <a:t>.”</a:t>
+              <a:t>Translation “We have no idea WTF it does and have no test automation on it to help us figure it out.”</a:t>
             </a:r>
             <a:endParaRPr lang="en-US" dirty="0"/>
           </a:p>
@@ -4069,7 +4051,6 @@
               <a:rPr lang="en-US" dirty="0" smtClean="0"/>
               <a:t>Functionality – Groups of functionality</a:t>
             </a:r>
-            <a:endParaRPr lang="en-US" dirty="0" smtClean="0"/>
           </a:p>
           <a:p>
             <a:pPr lvl="2"/>
@@ -4243,7 +4224,6 @@
               <a:rPr lang="en-US" dirty="0" smtClean="0"/>
               <a:t>Functionality – Groups of functionality</a:t>
             </a:r>
-            <a:endParaRPr lang="en-US" dirty="0" smtClean="0"/>
           </a:p>
           <a:p>
             <a:pPr lvl="2"/>
@@ -4381,7 +4361,6 @@
               <a:rPr lang="en-US" dirty="0" smtClean="0"/>
               <a:t>Functionality – Groups of functionality</a:t>
             </a:r>
-            <a:endParaRPr lang="en-US" dirty="0" smtClean="0"/>
           </a:p>
           <a:p>
             <a:pPr lvl="2"/>
@@ -4494,19 +4473,7 @@
           <a:p>
             <a:r>
               <a:rPr lang="en-US" dirty="0" smtClean="0"/>
-              <a:t>“The more units put into something the </a:t>
-            </a:r>
-            <a:r>
-              <a:rPr lang="en-US" dirty="0" smtClean="0"/>
-              <a:t>greater the </a:t>
-            </a:r>
-            <a:r>
-              <a:rPr lang="en-US" dirty="0" smtClean="0"/>
-              <a:t>feedback cycle and the less maintainable the </a:t>
-            </a:r>
-            <a:r>
-              <a:rPr lang="en-US" dirty="0" smtClean="0"/>
-              <a:t>test.”</a:t>
+              <a:t>“The more units put into something the greater the feedback cycle and the less maintainable the test.”</a:t>
             </a:r>
             <a:endParaRPr lang="en-US" dirty="0"/>
           </a:p>
@@ -4528,97 +4495,6 @@
 </file>
 
 <file path=ppt/slides/slide16.xml><?xml version="1.0" encoding="utf-8"?>
-<p:sld xmlns:a="http://schemas.openxmlformats.org/drawingml/2006/main" xmlns:r="http://schemas.openxmlformats.org/officeDocument/2006/relationships" xmlns:p="http://schemas.openxmlformats.org/presentationml/2006/main">
-  <p:cSld>
-    <p:spTree>
-      <p:nvGrpSpPr>
-        <p:cNvPr id="1" name=""/>
-        <p:cNvGrpSpPr/>
-        <p:nvPr/>
-      </p:nvGrpSpPr>
-      <p:grpSpPr>
-        <a:xfrm>
-          <a:off x="0" y="0"/>
-          <a:ext cx="0" cy="0"/>
-          <a:chOff x="0" y="0"/>
-          <a:chExt cx="0" cy="0"/>
-        </a:xfrm>
-      </p:grpSpPr>
-      <p:sp>
-        <p:nvSpPr>
-          <p:cNvPr id="2" name="Title 1"/>
-          <p:cNvSpPr>
-            <a:spLocks noGrp="1"/>
-          </p:cNvSpPr>
-          <p:nvPr>
-            <p:ph type="title"/>
-          </p:nvPr>
-        </p:nvSpPr>
-        <p:spPr/>
-        <p:txBody>
-          <a:bodyPr>
-            <a:normAutofit/>
-          </a:bodyPr>
-          <a:lstStyle/>
-          <a:p>
-            <a:r>
-              <a:rPr lang="en-US" dirty="0" smtClean="0"/>
-              <a:t>Unit Testing?</a:t>
-            </a:r>
-            <a:endParaRPr lang="en-US" dirty="0"/>
-          </a:p>
-        </p:txBody>
-      </p:sp>
-      <p:sp>
-        <p:nvSpPr>
-          <p:cNvPr id="3" name="Content Placeholder 2"/>
-          <p:cNvSpPr>
-            <a:spLocks noGrp="1"/>
-          </p:cNvSpPr>
-          <p:nvPr>
-            <p:ph idx="1"/>
-          </p:nvPr>
-        </p:nvSpPr>
-        <p:spPr/>
-        <p:txBody>
-          <a:bodyPr>
-            <a:normAutofit/>
-          </a:bodyPr>
-          <a:lstStyle/>
-          <a:p>
-            <a:r>
-              <a:rPr lang="en-US" dirty="0" smtClean="0"/>
-              <a:t>Unit</a:t>
-            </a:r>
-            <a:endParaRPr lang="en-US" dirty="0" smtClean="0"/>
-          </a:p>
-          <a:p>
-            <a:pPr>
-              <a:buNone/>
-            </a:pPr>
-            <a:r>
-              <a:rPr lang="en-US" dirty="0" smtClean="0"/>
-              <a:t>		</a:t>
-            </a:r>
-          </a:p>
-        </p:txBody>
-      </p:sp>
-    </p:spTree>
-  </p:cSld>
-  <p:clrMapOvr>
-    <a:masterClrMapping/>
-  </p:clrMapOvr>
-  <p:timing>
-    <p:tnLst>
-      <p:par>
-        <p:cTn id="1" dur="indefinite" restart="never" nodeType="tmRoot"/>
-      </p:par>
-    </p:tnLst>
-  </p:timing>
-</p:sld>
-</file>
-
-<file path=ppt/slides/slide17.xml><?xml version="1.0" encoding="utf-8"?>
 <p:sld xmlns:a="http://schemas.openxmlformats.org/drawingml/2006/main" xmlns:r="http://schemas.openxmlformats.org/officeDocument/2006/relationships" xmlns:p="http://schemas.openxmlformats.org/presentationml/2006/main">
   <p:cSld>
     <p:spTree>
@@ -4746,6 +4622,119 @@
 </p:sld>
 </file>
 
+<file path=ppt/slides/slide17.xml><?xml version="1.0" encoding="utf-8"?>
+<p:sld xmlns:a="http://schemas.openxmlformats.org/drawingml/2006/main" xmlns:r="http://schemas.openxmlformats.org/officeDocument/2006/relationships" xmlns:p="http://schemas.openxmlformats.org/presentationml/2006/main">
+  <p:cSld>
+    <p:spTree>
+      <p:nvGrpSpPr>
+        <p:cNvPr id="1" name=""/>
+        <p:cNvGrpSpPr/>
+        <p:nvPr/>
+      </p:nvGrpSpPr>
+      <p:grpSpPr>
+        <a:xfrm>
+          <a:off x="0" y="0"/>
+          <a:ext cx="0" cy="0"/>
+          <a:chOff x="0" y="0"/>
+          <a:chExt cx="0" cy="0"/>
+        </a:xfrm>
+      </p:grpSpPr>
+      <p:sp>
+        <p:nvSpPr>
+          <p:cNvPr id="2" name="Title 1"/>
+          <p:cNvSpPr>
+            <a:spLocks noGrp="1"/>
+          </p:cNvSpPr>
+          <p:nvPr>
+            <p:ph type="title"/>
+          </p:nvPr>
+        </p:nvSpPr>
+        <p:spPr/>
+        <p:txBody>
+          <a:bodyPr>
+            <a:normAutofit/>
+          </a:bodyPr>
+          <a:lstStyle/>
+          <a:p>
+            <a:r>
+              <a:rPr lang="en-US" dirty="0" smtClean="0"/>
+              <a:t>Integration Testing</a:t>
+            </a:r>
+            <a:endParaRPr lang="en-US" dirty="0"/>
+          </a:p>
+        </p:txBody>
+      </p:sp>
+      <p:sp>
+        <p:nvSpPr>
+          <p:cNvPr id="3" name="Content Placeholder 2"/>
+          <p:cNvSpPr>
+            <a:spLocks noGrp="1"/>
+          </p:cNvSpPr>
+          <p:nvPr>
+            <p:ph idx="1"/>
+          </p:nvPr>
+        </p:nvSpPr>
+        <p:spPr/>
+        <p:txBody>
+          <a:bodyPr>
+            <a:normAutofit/>
+          </a:bodyPr>
+          <a:lstStyle/>
+          <a:p>
+            <a:r>
+              <a:rPr lang="en-US" dirty="0" smtClean="0"/>
+              <a:t>Integration</a:t>
+            </a:r>
+          </a:p>
+          <a:p>
+            <a:pPr lvl="1"/>
+            <a:r>
+              <a:rPr lang="en-US" dirty="0" smtClean="0"/>
+              <a:t>Functionality – Groups of functionality</a:t>
+            </a:r>
+          </a:p>
+          <a:p>
+            <a:pPr lvl="1"/>
+            <a:r>
+              <a:rPr lang="en-US" dirty="0" smtClean="0"/>
+              <a:t>Database Tests</a:t>
+            </a:r>
+          </a:p>
+          <a:p>
+            <a:pPr>
+              <a:buNone/>
+            </a:pPr>
+            <a:r>
+              <a:rPr lang="en-US" dirty="0" smtClean="0"/>
+              <a:t>	</a:t>
+            </a:r>
+          </a:p>
+          <a:p>
+            <a:pPr>
+              <a:buNone/>
+            </a:pPr>
+            <a:r>
+              <a:rPr lang="en-US" dirty="0" smtClean="0"/>
+              <a:t>“Anything that tests more than one unit as part of the same test is an integration”</a:t>
+            </a:r>
+          </a:p>
+        </p:txBody>
+      </p:sp>
+    </p:spTree>
+  </p:cSld>
+  <p:clrMapOvr>
+    <a:masterClrMapping/>
+  </p:clrMapOvr>
+  <p:timing>
+    <p:tnLst>
+      <p:par>
+        <p:cTn id="1" dur="indefinite" restart="never" nodeType="tmRoot"/>
+      </p:par>
+    </p:tnLst>
+  </p:timing>
+</p:sld>
+</file>
+
 <file path=ppt/slides/slide18.xml><?xml version="1.0" encoding="utf-8"?>
 <p:sld xmlns:a="http://schemas.openxmlformats.org/drawingml/2006/main" xmlns:r="http://schemas.openxmlformats.org/officeDocument/2006/relationships" xmlns:p="http://schemas.openxmlformats.org/presentationml/2006/main">
   <p:cSld>
@@ -4773,77 +4762,23 @@
             <p:ph type="title"/>
           </p:nvPr>
         </p:nvSpPr>
-        <p:spPr/>
+        <p:spPr>
+          <a:xfrm>
+            <a:off x="457200" y="2857500"/>
+            <a:ext cx="8229600" cy="1143000"/>
+          </a:xfrm>
+        </p:spPr>
         <p:txBody>
           <a:bodyPr>
-            <a:normAutofit/>
+            <a:normAutofit fontScale="90000"/>
           </a:bodyPr>
           <a:lstStyle/>
           <a:p>
             <a:r>
               <a:rPr lang="en-US" dirty="0" smtClean="0"/>
-              <a:t>Integration Testing</a:t>
+              <a:t>But wait, couldn’t that mean all tests are integration?</a:t>
             </a:r>
             <a:endParaRPr lang="en-US" dirty="0"/>
-          </a:p>
-        </p:txBody>
-      </p:sp>
-      <p:sp>
-        <p:nvSpPr>
-          <p:cNvPr id="3" name="Content Placeholder 2"/>
-          <p:cNvSpPr>
-            <a:spLocks noGrp="1"/>
-          </p:cNvSpPr>
-          <p:nvPr>
-            <p:ph idx="1"/>
-          </p:nvPr>
-        </p:nvSpPr>
-        <p:spPr/>
-        <p:txBody>
-          <a:bodyPr>
-            <a:normAutofit/>
-          </a:bodyPr>
-          <a:lstStyle/>
-          <a:p>
-            <a:r>
-              <a:rPr lang="en-US" dirty="0" smtClean="0"/>
-              <a:t>Integration</a:t>
-            </a:r>
-            <a:endParaRPr lang="en-US" dirty="0" smtClean="0"/>
-          </a:p>
-          <a:p>
-            <a:pPr lvl="1"/>
-            <a:r>
-              <a:rPr lang="en-US" dirty="0" smtClean="0"/>
-              <a:t>Functionality – Groups of functionality</a:t>
-            </a:r>
-            <a:endParaRPr lang="en-US" dirty="0" smtClean="0"/>
-          </a:p>
-          <a:p>
-            <a:pPr lvl="1"/>
-            <a:r>
-              <a:rPr lang="en-US" dirty="0" smtClean="0"/>
-              <a:t>Database Tests</a:t>
-            </a:r>
-          </a:p>
-          <a:p>
-            <a:pPr>
-              <a:buNone/>
-            </a:pPr>
-            <a:r>
-              <a:rPr lang="en-US" dirty="0" smtClean="0"/>
-              <a:t>	</a:t>
-            </a:r>
-            <a:endParaRPr lang="en-US" dirty="0" smtClean="0"/>
-          </a:p>
-          <a:p>
-            <a:pPr>
-              <a:buNone/>
-            </a:pPr>
-            <a:r>
-              <a:rPr lang="en-US" dirty="0" smtClean="0"/>
-              <a:t>“Anything that tests more than one unit as part of the same test is an integration”</a:t>
-            </a:r>
           </a:p>
         </p:txBody>
       </p:sp>
@@ -4889,23 +4824,89 @@
             <p:ph type="title"/>
           </p:nvPr>
         </p:nvSpPr>
-        <p:spPr>
-          <a:xfrm>
-            <a:off x="457200" y="2857500"/>
-            <a:ext cx="8229600" cy="1143000"/>
-          </a:xfrm>
-        </p:spPr>
+        <p:spPr/>
         <p:txBody>
           <a:bodyPr>
-            <a:normAutofit fontScale="90000"/>
+            <a:normAutofit/>
           </a:bodyPr>
           <a:lstStyle/>
           <a:p>
             <a:r>
               <a:rPr lang="en-US" dirty="0" smtClean="0"/>
-              <a:t>But wait, couldn’t that mean all tests are integration?</a:t>
+              <a:t>Integration Testing</a:t>
             </a:r>
             <a:endParaRPr lang="en-US" dirty="0"/>
+          </a:p>
+        </p:txBody>
+      </p:sp>
+      <p:sp>
+        <p:nvSpPr>
+          <p:cNvPr id="3" name="Content Placeholder 2"/>
+          <p:cNvSpPr>
+            <a:spLocks noGrp="1"/>
+          </p:cNvSpPr>
+          <p:nvPr>
+            <p:ph idx="1"/>
+          </p:nvPr>
+        </p:nvSpPr>
+        <p:spPr/>
+        <p:txBody>
+          <a:bodyPr>
+            <a:normAutofit lnSpcReduction="10000"/>
+          </a:bodyPr>
+          <a:lstStyle/>
+          <a:p>
+            <a:r>
+              <a:rPr lang="en-US" dirty="0" smtClean="0"/>
+              <a:t>Integration</a:t>
+            </a:r>
+          </a:p>
+          <a:p>
+            <a:pPr lvl="1"/>
+            <a:r>
+              <a:rPr lang="en-US" dirty="0" smtClean="0"/>
+              <a:t>Functionality – Groups of functionality</a:t>
+            </a:r>
+          </a:p>
+          <a:p>
+            <a:pPr lvl="1"/>
+            <a:r>
+              <a:rPr lang="en-US" dirty="0" smtClean="0"/>
+              <a:t>Database Tests</a:t>
+            </a:r>
+          </a:p>
+          <a:p>
+            <a:pPr>
+              <a:buNone/>
+            </a:pPr>
+            <a:r>
+              <a:rPr lang="en-US" dirty="0" smtClean="0"/>
+              <a:t>	</a:t>
+            </a:r>
+          </a:p>
+          <a:p>
+            <a:pPr>
+              <a:buNone/>
+            </a:pPr>
+            <a:r>
+              <a:rPr lang="en-US" dirty="0" smtClean="0"/>
+              <a:t>“Anything that tests more than one unit as part of the same test is an integration”</a:t>
+            </a:r>
+          </a:p>
+          <a:p>
+            <a:pPr>
+              <a:buNone/>
+            </a:pPr>
+            <a:endParaRPr lang="en-US" dirty="0" smtClean="0"/>
+          </a:p>
+          <a:p>
+            <a:pPr>
+              <a:buNone/>
+            </a:pPr>
+            <a:r>
+              <a:rPr lang="en-US" dirty="0" smtClean="0"/>
+              <a:t>Yes, most tests we write are a blend of unit and integration but we strive for unit testing</a:t>
+            </a:r>
           </a:p>
         </p:txBody>
       </p:sp>
@@ -5047,7 +5048,12 @@
             <p:ph type="title"/>
           </p:nvPr>
         </p:nvSpPr>
-        <p:spPr/>
+        <p:spPr>
+          <a:xfrm>
+            <a:off x="457200" y="2857500"/>
+            <a:ext cx="8229600" cy="1143000"/>
+          </a:xfrm>
+        </p:spPr>
         <p:txBody>
           <a:bodyPr>
             <a:normAutofit/>
@@ -5056,84 +5062,9 @@
           <a:p>
             <a:r>
               <a:rPr lang="en-US" dirty="0" smtClean="0"/>
-              <a:t>Integration Testing</a:t>
+              <a:t>Demo</a:t>
             </a:r>
             <a:endParaRPr lang="en-US" dirty="0"/>
-          </a:p>
-        </p:txBody>
-      </p:sp>
-      <p:sp>
-        <p:nvSpPr>
-          <p:cNvPr id="3" name="Content Placeholder 2"/>
-          <p:cNvSpPr>
-            <a:spLocks noGrp="1"/>
-          </p:cNvSpPr>
-          <p:nvPr>
-            <p:ph idx="1"/>
-          </p:nvPr>
-        </p:nvSpPr>
-        <p:spPr/>
-        <p:txBody>
-          <a:bodyPr>
-            <a:normAutofit lnSpcReduction="10000"/>
-          </a:bodyPr>
-          <a:lstStyle/>
-          <a:p>
-            <a:r>
-              <a:rPr lang="en-US" dirty="0" smtClean="0"/>
-              <a:t>Integration</a:t>
-            </a:r>
-            <a:endParaRPr lang="en-US" dirty="0" smtClean="0"/>
-          </a:p>
-          <a:p>
-            <a:pPr lvl="1"/>
-            <a:r>
-              <a:rPr lang="en-US" dirty="0" smtClean="0"/>
-              <a:t>Functionality – Groups of functionality</a:t>
-            </a:r>
-            <a:endParaRPr lang="en-US" dirty="0" smtClean="0"/>
-          </a:p>
-          <a:p>
-            <a:pPr lvl="1"/>
-            <a:r>
-              <a:rPr lang="en-US" dirty="0" smtClean="0"/>
-              <a:t>Database Tests</a:t>
-            </a:r>
-          </a:p>
-          <a:p>
-            <a:pPr>
-              <a:buNone/>
-            </a:pPr>
-            <a:r>
-              <a:rPr lang="en-US" dirty="0" smtClean="0"/>
-              <a:t>	</a:t>
-            </a:r>
-            <a:endParaRPr lang="en-US" dirty="0" smtClean="0"/>
-          </a:p>
-          <a:p>
-            <a:pPr>
-              <a:buNone/>
-            </a:pPr>
-            <a:r>
-              <a:rPr lang="en-US" dirty="0" smtClean="0"/>
-              <a:t>“Anything that tests more than one unit as part of the same test is an integration”</a:t>
-            </a:r>
-          </a:p>
-          <a:p>
-            <a:pPr>
-              <a:buNone/>
-            </a:pPr>
-            <a:endParaRPr lang="en-US" dirty="0" smtClean="0"/>
-          </a:p>
-          <a:p>
-            <a:pPr>
-              <a:buNone/>
-            </a:pPr>
-            <a:r>
-              <a:rPr lang="en-US" dirty="0" smtClean="0"/>
-              <a:t>Yes, most tests we write are a blend of unit and integration but we strive for unit testing</a:t>
-            </a:r>
-            <a:endParaRPr lang="en-US" dirty="0" smtClean="0"/>
           </a:p>
         </p:txBody>
       </p:sp>
@@ -5193,7 +5124,7 @@
           <a:p>
             <a:r>
               <a:rPr lang="en-US" dirty="0" smtClean="0"/>
-              <a:t>Demo</a:t>
+              <a:t>Mocking?</a:t>
             </a:r>
             <a:endParaRPr lang="en-US" dirty="0"/>
           </a:p>
@@ -5241,21 +5172,37 @@
             <p:ph type="title"/>
           </p:nvPr>
         </p:nvSpPr>
-        <p:spPr>
-          <a:xfrm>
-            <a:off x="457200" y="2857500"/>
-            <a:ext cx="8229600" cy="1143000"/>
-          </a:xfrm>
-        </p:spPr>
-        <p:txBody>
-          <a:bodyPr>
-            <a:normAutofit/>
-          </a:bodyPr>
-          <a:lstStyle/>
-          <a:p>
-            <a:r>
-              <a:rPr lang="en-US" dirty="0" smtClean="0"/>
-              <a:t>Mocking?</a:t>
+        <p:spPr/>
+        <p:txBody>
+          <a:bodyPr/>
+          <a:lstStyle/>
+          <a:p>
+            <a:r>
+              <a:rPr lang="en-US" dirty="0" smtClean="0"/>
+              <a:t>Where does mocking come in?</a:t>
+            </a:r>
+            <a:endParaRPr lang="en-US" dirty="0"/>
+          </a:p>
+        </p:txBody>
+      </p:sp>
+      <p:sp>
+        <p:nvSpPr>
+          <p:cNvPr id="3" name="Content Placeholder 2"/>
+          <p:cNvSpPr>
+            <a:spLocks noGrp="1"/>
+          </p:cNvSpPr>
+          <p:nvPr>
+            <p:ph idx="1"/>
+          </p:nvPr>
+        </p:nvSpPr>
+        <p:spPr/>
+        <p:txBody>
+          <a:bodyPr/>
+          <a:lstStyle/>
+          <a:p>
+            <a:r>
+              <a:rPr lang="en-US" dirty="0" smtClean="0"/>
+              <a:t>Fakes, mocks, stubs – oh my!</a:t>
             </a:r>
             <a:endParaRPr lang="en-US" dirty="0"/>
           </a:p>
@@ -5303,37 +5250,21 @@
             <p:ph type="title"/>
           </p:nvPr>
         </p:nvSpPr>
-        <p:spPr/>
-        <p:txBody>
-          <a:bodyPr/>
-          <a:lstStyle/>
-          <a:p>
-            <a:r>
-              <a:rPr lang="en-US" dirty="0" smtClean="0"/>
-              <a:t>Where does mocking come in?</a:t>
-            </a:r>
-            <a:endParaRPr lang="en-US" dirty="0"/>
-          </a:p>
-        </p:txBody>
-      </p:sp>
-      <p:sp>
-        <p:nvSpPr>
-          <p:cNvPr id="3" name="Content Placeholder 2"/>
-          <p:cNvSpPr>
-            <a:spLocks noGrp="1"/>
-          </p:cNvSpPr>
-          <p:nvPr>
-            <p:ph idx="1"/>
-          </p:nvPr>
-        </p:nvSpPr>
-        <p:spPr/>
-        <p:txBody>
-          <a:bodyPr/>
-          <a:lstStyle/>
-          <a:p>
-            <a:r>
-              <a:rPr lang="en-US" dirty="0" smtClean="0"/>
-              <a:t>Fakes, mocks, stubs – oh my!</a:t>
+        <p:spPr>
+          <a:xfrm>
+            <a:off x="457200" y="2857500"/>
+            <a:ext cx="8229600" cy="1143000"/>
+          </a:xfrm>
+        </p:spPr>
+        <p:txBody>
+          <a:bodyPr>
+            <a:normAutofit/>
+          </a:bodyPr>
+          <a:lstStyle/>
+          <a:p>
+            <a:r>
+              <a:rPr lang="en-US" dirty="0" smtClean="0"/>
+              <a:t>Behavior Driven Development…</a:t>
             </a:r>
             <a:endParaRPr lang="en-US" dirty="0"/>
           </a:p>
@@ -5381,21 +5312,53 @@
             <p:ph type="title"/>
           </p:nvPr>
         </p:nvSpPr>
-        <p:spPr>
-          <a:xfrm>
-            <a:off x="457200" y="2857500"/>
-            <a:ext cx="8229600" cy="1143000"/>
-          </a:xfrm>
-        </p:spPr>
-        <p:txBody>
-          <a:bodyPr>
-            <a:normAutofit/>
-          </a:bodyPr>
-          <a:lstStyle/>
-          <a:p>
-            <a:r>
-              <a:rPr lang="en-US" dirty="0" smtClean="0"/>
-              <a:t>Behavior Driven Development…</a:t>
+        <p:spPr/>
+        <p:txBody>
+          <a:bodyPr/>
+          <a:lstStyle/>
+          <a:p>
+            <a:r>
+              <a:rPr lang="en-US" dirty="0" smtClean="0"/>
+              <a:t>This is not BDD..</a:t>
+            </a:r>
+            <a:endParaRPr lang="en-US" dirty="0"/>
+          </a:p>
+        </p:txBody>
+      </p:sp>
+      <p:sp>
+        <p:nvSpPr>
+          <p:cNvPr id="3" name="Content Placeholder 2"/>
+          <p:cNvSpPr>
+            <a:spLocks noGrp="1"/>
+          </p:cNvSpPr>
+          <p:nvPr>
+            <p:ph idx="1"/>
+          </p:nvPr>
+        </p:nvSpPr>
+        <p:spPr/>
+        <p:txBody>
+          <a:bodyPr/>
+          <a:lstStyle/>
+          <a:p>
+            <a:r>
+              <a:rPr lang="en-US" dirty="0" smtClean="0"/>
+              <a:t>..but  the style of writing for your tests in a natural language</a:t>
+            </a:r>
+          </a:p>
+          <a:p>
+            <a:r>
+              <a:rPr lang="en-US" dirty="0" smtClean="0"/>
+              <a:t>Describe behaviors and interactions</a:t>
+            </a:r>
+          </a:p>
+          <a:p>
+            <a:r>
+              <a:rPr lang="en-US" dirty="0" smtClean="0"/>
+              <a:t>Think not about “tests” but about behaviors </a:t>
+            </a:r>
+            <a:r>
+              <a:rPr lang="en-US" smtClean="0"/>
+              <a:t>and specifications</a:t>
             </a:r>
             <a:endParaRPr lang="en-US" dirty="0"/>
           </a:p>
@@ -5406,13 +5369,6 @@
   <p:clrMapOvr>
     <a:masterClrMapping/>
   </p:clrMapOvr>
-  <p:timing>
-    <p:tnLst>
-      <p:par>
-        <p:cTn id="1" dur="indefinite" restart="never" nodeType="tmRoot"/>
-      </p:par>
-    </p:tnLst>
-  </p:timing>
 </p:sld>
 </file>
 
@@ -5533,10 +5489,55 @@
           <a:bodyPr/>
           <a:lstStyle/>
           <a:p>
-            <a:endParaRPr lang="en-US"/>
-          </a:p>
-        </p:txBody>
-      </p:sp>
+            <a:r>
+              <a:rPr lang="en-US" dirty="0" smtClean="0"/>
+              <a:t>https://github.com/scottmuc/Pester</a:t>
+            </a:r>
+            <a:endParaRPr lang="en-US" dirty="0" smtClean="0"/>
+          </a:p>
+          <a:p>
+            <a:r>
+              <a:rPr lang="en-US" dirty="0" smtClean="0"/>
+              <a:t>BDD style of test writing</a:t>
+            </a:r>
+          </a:p>
+          <a:p>
+            <a:endParaRPr lang="en-US" dirty="0"/>
+          </a:p>
+        </p:txBody>
+      </p:sp>
+      <p:pic>
+        <p:nvPicPr>
+          <p:cNvPr id="1026" name="Picture 2"/>
+          <p:cNvPicPr>
+            <a:picLocks noChangeAspect="1" noChangeArrowheads="1"/>
+          </p:cNvPicPr>
+          <p:nvPr/>
+        </p:nvPicPr>
+        <p:blipFill>
+          <a:blip r:embed="rId2" cstate="print"/>
+          <a:srcRect/>
+          <a:stretch>
+            <a:fillRect/>
+          </a:stretch>
+        </p:blipFill>
+        <p:spPr bwMode="auto">
+          <a:xfrm>
+            <a:off x="838200" y="3200400"/>
+            <a:ext cx="6162675" cy="2695575"/>
+          </a:xfrm>
+          <a:prstGeom prst="rect">
+            <a:avLst/>
+          </a:prstGeom>
+          <a:noFill/>
+          <a:ln w="9525">
+            <a:noFill/>
+            <a:miter lim="800000"/>
+            <a:headEnd/>
+            <a:tailEnd/>
+          </a:ln>
+        </p:spPr>
+      </p:pic>
     </p:spTree>
   </p:cSld>
   <p:clrMapOvr>
@@ -5600,7 +5601,17 @@
           <a:bodyPr/>
           <a:lstStyle/>
           <a:p>
-            <a:endParaRPr lang="en-US"/>
+            <a:r>
+              <a:rPr lang="en-US" dirty="0" smtClean="0"/>
+              <a:t>Does not get you to unit testing alone</a:t>
+            </a:r>
+          </a:p>
+          <a:p>
+            <a:r>
+              <a:rPr lang="en-US" dirty="0" smtClean="0"/>
+              <a:t>Does no mocking</a:t>
+            </a:r>
+            <a:endParaRPr lang="en-US" dirty="0"/>
           </a:p>
         </p:txBody>
       </p:sp>
@@ -5646,11 +5657,7 @@
           <a:p>
             <a:r>
               <a:rPr lang="en-US" dirty="0" smtClean="0"/>
-              <a:t>PowerShell Unit </a:t>
-            </a:r>
-            <a:r>
-              <a:rPr lang="en-US" dirty="0" smtClean="0"/>
-              <a:t>Testing</a:t>
+              <a:t>How to get there</a:t>
             </a:r>
             <a:endParaRPr lang="en-US" dirty="0"/>
           </a:p>
@@ -5673,18 +5680,15 @@
           <a:p>
             <a:r>
               <a:rPr lang="en-US" dirty="0" smtClean="0"/>
-              <a:t>A PowerShell unit is a function</a:t>
-            </a:r>
-          </a:p>
-          <a:p>
-            <a:endParaRPr lang="en-US" dirty="0" smtClean="0"/>
-          </a:p>
-          <a:p>
-            <a:r>
-              <a:rPr lang="en-US" dirty="0" smtClean="0"/>
-              <a:t>Functions can be overwritten by scoping a function of the same name</a:t>
-            </a:r>
-            <a:endParaRPr lang="en-US" dirty="0" smtClean="0"/>
+              <a:t>A little ingenuity</a:t>
+            </a:r>
+          </a:p>
+          <a:p>
+            <a:r>
+              <a:rPr lang="en-US" dirty="0" smtClean="0"/>
+              <a:t>Maybe a mocking framework for PowerShell in the future</a:t>
+            </a:r>
+            <a:endParaRPr lang="en-US" dirty="0"/>
           </a:p>
         </p:txBody>
       </p:sp>
@@ -5693,13 +5697,6 @@
   <p:clrMapOvr>
     <a:masterClrMapping/>
   </p:clrMapOvr>
-  <p:timing>
-    <p:tnLst>
-      <p:par>
-        <p:cTn id="1" dur="indefinite" restart="never" nodeType="tmRoot"/>
-      </p:par>
-    </p:tnLst>
-  </p:timing>
 </p:sld>
 </file>
 
@@ -5737,7 +5734,7 @@
           <a:p>
             <a:r>
               <a:rPr lang="en-US" dirty="0" smtClean="0"/>
-              <a:t>PowerShell Stubbing</a:t>
+              <a:t>PowerShell Unit Testing</a:t>
             </a:r>
             <a:endParaRPr lang="en-US" dirty="0"/>
           </a:p>
@@ -5760,13 +5757,7 @@
           <a:p>
             <a:r>
               <a:rPr lang="en-US" dirty="0" smtClean="0"/>
-              <a:t>Functions can be overwritten by a function of the same name and parameters</a:t>
-            </a:r>
-          </a:p>
-          <a:p>
-            <a:r>
-              <a:rPr lang="en-US" dirty="0" smtClean="0"/>
-              <a:t>This allows you to interrupt and stub the functionality</a:t>
+              <a:t>A PowerShell unit is a function</a:t>
             </a:r>
           </a:p>
           <a:p>
@@ -5775,9 +5766,8 @@
           <a:p>
             <a:r>
               <a:rPr lang="en-US" dirty="0" smtClean="0"/>
-              <a:t>“I want behavior verification. I want my mock”</a:t>
-            </a:r>
-            <a:endParaRPr lang="en-US" dirty="0" smtClean="0"/>
+              <a:t>Functions can be overwritten by scoping a function of the same name</a:t>
+            </a:r>
           </a:p>
         </p:txBody>
       </p:sp>
@@ -5979,7 +5969,7 @@
           <a:p>
             <a:r>
               <a:rPr lang="en-US" dirty="0" smtClean="0"/>
-              <a:t>PowerShell Mocking</a:t>
+              <a:t>PowerShell Stubbing</a:t>
             </a:r>
             <a:endParaRPr lang="en-US" dirty="0"/>
           </a:p>
@@ -6002,9 +5992,23 @@
           <a:p>
             <a:r>
               <a:rPr lang="en-US" dirty="0" smtClean="0"/>
-              <a:t>After you have implemented the stubs you allow different behaviors to be returned through conventional properties and flags</a:t>
-            </a:r>
+              <a:t>Functions can be overwritten by a function of the same name and parameters</a:t>
+            </a:r>
+          </a:p>
+          <a:p>
+            <a:r>
+              <a:rPr lang="en-US" dirty="0" smtClean="0"/>
+              <a:t>This allows you to interrupt and stub the functionality</a:t>
+            </a:r>
+          </a:p>
+          <a:p>
             <a:endParaRPr lang="en-US" dirty="0" smtClean="0"/>
+          </a:p>
+          <a:p>
+            <a:r>
+              <a:rPr lang="en-US" dirty="0" smtClean="0"/>
+              <a:t>“I want behavior verification. I want my mock”</a:t>
+            </a:r>
           </a:p>
         </p:txBody>
       </p:sp>
@@ -6057,6 +6061,145 @@
           <a:p>
             <a:r>
               <a:rPr lang="en-US" dirty="0" smtClean="0"/>
+              <a:t>PowerShell Mocking</a:t>
+            </a:r>
+            <a:endParaRPr lang="en-US" dirty="0"/>
+          </a:p>
+        </p:txBody>
+      </p:sp>
+      <p:sp>
+        <p:nvSpPr>
+          <p:cNvPr id="3" name="Content Placeholder 2"/>
+          <p:cNvSpPr>
+            <a:spLocks noGrp="1"/>
+          </p:cNvSpPr>
+          <p:nvPr>
+            <p:ph idx="1"/>
+          </p:nvPr>
+        </p:nvSpPr>
+        <p:spPr/>
+        <p:txBody>
+          <a:bodyPr/>
+          <a:lstStyle/>
+          <a:p>
+            <a:r>
+              <a:rPr lang="en-US" dirty="0" smtClean="0"/>
+              <a:t>After you have implemented the stubs you allow different behaviors to be returned through conventional properties and flags</a:t>
+            </a:r>
+          </a:p>
+        </p:txBody>
+      </p:sp>
+    </p:spTree>
+  </p:cSld>
+  <p:clrMapOvr>
+    <a:masterClrMapping/>
+  </p:clrMapOvr>
+  <p:timing>
+    <p:tnLst>
+      <p:par>
+        <p:cTn id="1" dur="indefinite" restart="never" nodeType="tmRoot"/>
+      </p:par>
+    </p:tnLst>
+  </p:timing>
+</p:sld>
+</file>
+
+<file path=ppt/slides/slide32.xml><?xml version="1.0" encoding="utf-8"?>
+<p:sld xmlns:a="http://schemas.openxmlformats.org/drawingml/2006/main" xmlns:r="http://schemas.openxmlformats.org/officeDocument/2006/relationships" xmlns:p="http://schemas.openxmlformats.org/presentationml/2006/main">
+  <p:cSld>
+    <p:spTree>
+      <p:nvGrpSpPr>
+        <p:cNvPr id="1" name=""/>
+        <p:cNvGrpSpPr/>
+        <p:nvPr/>
+      </p:nvGrpSpPr>
+      <p:grpSpPr>
+        <a:xfrm>
+          <a:off x="0" y="0"/>
+          <a:ext cx="0" cy="0"/>
+          <a:chOff x="0" y="0"/>
+          <a:chExt cx="0" cy="0"/>
+        </a:xfrm>
+      </p:grpSpPr>
+      <p:sp>
+        <p:nvSpPr>
+          <p:cNvPr id="2" name="Title 1"/>
+          <p:cNvSpPr>
+            <a:spLocks noGrp="1"/>
+          </p:cNvSpPr>
+          <p:nvPr>
+            <p:ph type="title"/>
+          </p:nvPr>
+        </p:nvSpPr>
+        <p:spPr>
+          <a:xfrm>
+            <a:off x="457200" y="2857500"/>
+            <a:ext cx="8229600" cy="1143000"/>
+          </a:xfrm>
+        </p:spPr>
+        <p:txBody>
+          <a:bodyPr>
+            <a:normAutofit/>
+          </a:bodyPr>
+          <a:lstStyle/>
+          <a:p>
+            <a:r>
+              <a:rPr lang="en-US" dirty="0" smtClean="0"/>
+              <a:t>Demo</a:t>
+            </a:r>
+            <a:endParaRPr lang="en-US" dirty="0"/>
+          </a:p>
+        </p:txBody>
+      </p:sp>
+    </p:spTree>
+  </p:cSld>
+  <p:clrMapOvr>
+    <a:masterClrMapping/>
+  </p:clrMapOvr>
+  <p:timing>
+    <p:tnLst>
+      <p:par>
+        <p:cTn id="1" dur="indefinite" restart="never" nodeType="tmRoot"/>
+      </p:par>
+    </p:tnLst>
+  </p:timing>
+</p:sld>
+</file>
+
+<file path=ppt/slides/slide33.xml><?xml version="1.0" encoding="utf-8"?>
+<p:sld xmlns:a="http://schemas.openxmlformats.org/drawingml/2006/main" xmlns:r="http://schemas.openxmlformats.org/officeDocument/2006/relationships" xmlns:p="http://schemas.openxmlformats.org/presentationml/2006/main">
+  <p:cSld>
+    <p:spTree>
+      <p:nvGrpSpPr>
+        <p:cNvPr id="1" name=""/>
+        <p:cNvGrpSpPr/>
+        <p:nvPr/>
+      </p:nvGrpSpPr>
+      <p:grpSpPr>
+        <a:xfrm>
+          <a:off x="0" y="0"/>
+          <a:ext cx="0" cy="0"/>
+          <a:chOff x="0" y="0"/>
+          <a:chExt cx="0" cy="0"/>
+        </a:xfrm>
+      </p:grpSpPr>
+      <p:sp>
+        <p:nvSpPr>
+          <p:cNvPr id="2" name="Title 1"/>
+          <p:cNvSpPr>
+            <a:spLocks noGrp="1"/>
+          </p:cNvSpPr>
+          <p:nvPr>
+            <p:ph type="title"/>
+          </p:nvPr>
+        </p:nvSpPr>
+        <p:spPr/>
+        <p:txBody>
+          <a:bodyPr/>
+          <a:lstStyle/>
+          <a:p>
+            <a:r>
+              <a:rPr lang="en-US" dirty="0" smtClean="0"/>
               <a:t>Questions?</a:t>
             </a:r>
             <a:endParaRPr lang="en-US" dirty="0"/>
@@ -6138,7 +6281,7 @@
 </p:sld>
 </file>
 
-<file path=ppt/slides/slide32.xml><?xml version="1.0" encoding="utf-8"?>
+<file path=ppt/slides/slide34.xml><?xml version="1.0" encoding="utf-8"?>
 <p:sld xmlns:a="http://schemas.openxmlformats.org/drawingml/2006/main" xmlns:r="http://schemas.openxmlformats.org/officeDocument/2006/relationships" xmlns:p="http://schemas.openxmlformats.org/presentationml/2006/main">
   <p:cSld>
     <p:spTree>
@@ -6254,7 +6397,7 @@
         </p:spPr>
         <p:txBody>
           <a:bodyPr>
-            <a:normAutofit lnSpcReduction="10000"/>
+            <a:normAutofit fontScale="77500" lnSpcReduction="20000"/>
           </a:bodyPr>
           <a:lstStyle/>
           <a:p>
@@ -6296,27 +6439,55 @@
               <a:rPr lang="en-US" dirty="0" smtClean="0"/>
               <a:t>Development…</a:t>
             </a:r>
+          </a:p>
+          <a:p>
+            <a:pPr lvl="1"/>
+            <a:r>
+              <a:rPr lang="en-US" dirty="0" smtClean="0"/>
+              <a:t>What does it all mean?</a:t>
+            </a:r>
+          </a:p>
+          <a:p>
+            <a:r>
+              <a:rPr lang="en-US" dirty="0" smtClean="0"/>
+              <a:t>..but like for PowerShell?</a:t>
+            </a:r>
+          </a:p>
+          <a:p>
+            <a:pPr lvl="1"/>
+            <a:r>
+              <a:rPr lang="en-US" dirty="0" smtClean="0"/>
+              <a:t>Pester</a:t>
+            </a:r>
+          </a:p>
+          <a:p>
+            <a:pPr>
+              <a:buNone/>
+            </a:pPr>
             <a:endParaRPr lang="en-US" dirty="0" smtClean="0"/>
           </a:p>
           <a:p>
-            <a:pPr lvl="1"/>
-            <a:r>
-              <a:rPr lang="en-US" dirty="0" smtClean="0"/>
-              <a:t>What does it all mean?</a:t>
-            </a:r>
-          </a:p>
-          <a:p>
-            <a:r>
-              <a:rPr lang="en-US" dirty="0" smtClean="0"/>
-              <a:t>..but like for PowerShell?</a:t>
-            </a:r>
-          </a:p>
-          <a:p>
-            <a:pPr lvl="1"/>
-            <a:r>
-              <a:rPr lang="en-US" dirty="0" smtClean="0"/>
-              <a:t>Pester</a:t>
-            </a:r>
+            <a:pPr>
+              <a:buNone/>
+            </a:pPr>
+            <a:r>
+              <a:rPr lang="en-US" dirty="0" smtClean="0"/>
+              <a:t>Entire presentation w/examples:</a:t>
+            </a:r>
+          </a:p>
+          <a:p>
+            <a:pPr>
+              <a:buNone/>
+            </a:pPr>
+            <a:r>
+              <a:rPr lang="en-US" dirty="0" smtClean="0"/>
+              <a:t>http</a:t>
+            </a:r>
+            <a:r>
+              <a:rPr lang="en-US" dirty="0" smtClean="0"/>
+              <a:t>://bit.ly/powershellbdd </a:t>
+            </a:r>
+            <a:endParaRPr lang="en-US" dirty="0" smtClean="0"/>
           </a:p>
         </p:txBody>
       </p:sp>

</xml_diff>

<commit_message>
finishing the presentation slidedeck
</commit_message>
<xml_diff>
--- a/dotNet/powershellbdd/AutomatedTestingForPowerShell.pptx
+++ b/dotNet/powershellbdd/AutomatedTestingForPowerShell.pptx
@@ -5,7 +5,7 @@
     <p:sldMasterId id="2147483756" r:id="rId1"/>
   </p:sldMasterIdLst>
   <p:notesMasterIdLst>
-    <p:notesMasterId r:id="rId36"/>
+    <p:notesMasterId r:id="rId39"/>
   </p:notesMasterIdLst>
   <p:sldIdLst>
     <p:sldId id="256" r:id="rId2"/>
@@ -30,18 +30,21 @@
     <p:sldId id="354" r:id="rId21"/>
     <p:sldId id="353" r:id="rId22"/>
     <p:sldId id="337" r:id="rId23"/>
-    <p:sldId id="357" r:id="rId24"/>
-    <p:sldId id="365" r:id="rId25"/>
-    <p:sldId id="355" r:id="rId26"/>
-    <p:sldId id="356" r:id="rId27"/>
-    <p:sldId id="362" r:id="rId28"/>
-    <p:sldId id="363" r:id="rId29"/>
-    <p:sldId id="358" r:id="rId30"/>
-    <p:sldId id="359" r:id="rId31"/>
-    <p:sldId id="361" r:id="rId32"/>
-    <p:sldId id="364" r:id="rId33"/>
-    <p:sldId id="297" r:id="rId34"/>
-    <p:sldId id="341" r:id="rId35"/>
+    <p:sldId id="366" r:id="rId24"/>
+    <p:sldId id="357" r:id="rId25"/>
+    <p:sldId id="365" r:id="rId26"/>
+    <p:sldId id="367" r:id="rId27"/>
+    <p:sldId id="355" r:id="rId28"/>
+    <p:sldId id="356" r:id="rId29"/>
+    <p:sldId id="368" r:id="rId30"/>
+    <p:sldId id="362" r:id="rId31"/>
+    <p:sldId id="363" r:id="rId32"/>
+    <p:sldId id="358" r:id="rId33"/>
+    <p:sldId id="359" r:id="rId34"/>
+    <p:sldId id="361" r:id="rId35"/>
+    <p:sldId id="364" r:id="rId36"/>
+    <p:sldId id="297" r:id="rId37"/>
+    <p:sldId id="341" r:id="rId38"/>
   </p:sldIdLst>
   <p:sldSz cx="9144000" cy="6858000" type="screen4x3"/>
   <p:notesSz cx="6858000" cy="9144000"/>
@@ -5112,7 +5115,7 @@
         </p:nvSpPr>
         <p:spPr>
           <a:xfrm>
-            <a:off x="457200" y="2857500"/>
+            <a:off x="457200" y="3276600"/>
             <a:ext cx="8229600" cy="1143000"/>
           </a:xfrm>
         </p:spPr>
@@ -5124,12 +5127,38 @@
           <a:p>
             <a:r>
               <a:rPr lang="en-US" dirty="0" smtClean="0"/>
-              <a:t>Mocking?</a:t>
+              <a:t>Where does Mocking come in?</a:t>
             </a:r>
             <a:endParaRPr lang="en-US" dirty="0"/>
           </a:p>
         </p:txBody>
       </p:sp>
+      <p:pic>
+        <p:nvPicPr>
+          <p:cNvPr id="15364" name="Picture 4" descr="Futurama Fry"/>
+          <p:cNvPicPr>
+            <a:picLocks noChangeAspect="1" noChangeArrowheads="1"/>
+          </p:cNvPicPr>
+          <p:nvPr/>
+        </p:nvPicPr>
+        <p:blipFill>
+          <a:blip r:embed="rId2" cstate="print"/>
+          <a:srcRect/>
+          <a:stretch>
+            <a:fillRect/>
+          </a:stretch>
+        </p:blipFill>
+        <p:spPr bwMode="auto">
+          <a:xfrm>
+            <a:off x="2628900" y="533400"/>
+            <a:ext cx="3886200" cy="2914650"/>
+          </a:xfrm>
+          <a:prstGeom prst="rect">
+            <a:avLst/>
+          </a:prstGeom>
+          <a:noFill/>
+        </p:spPr>
+      </p:pic>
     </p:spTree>
   </p:cSld>
   <p:clrMapOvr>
@@ -5197,12 +5226,95 @@
         </p:nvSpPr>
         <p:spPr/>
         <p:txBody>
-          <a:bodyPr/>
-          <a:lstStyle/>
-          <a:p>
-            <a:r>
-              <a:rPr lang="en-US" dirty="0" smtClean="0"/>
-              <a:t>Fakes, mocks, stubs – oh my!</a:t>
+          <a:bodyPr>
+            <a:normAutofit lnSpcReduction="10000"/>
+          </a:bodyPr>
+          <a:lstStyle/>
+          <a:p>
+            <a:r>
+              <a:rPr lang="en-US" dirty="0" smtClean="0"/>
+              <a:t>Fakes</a:t>
+            </a:r>
+            <a:r>
+              <a:rPr lang="en-US" dirty="0" smtClean="0"/>
+              <a:t>, mocks, stubs – oh my</a:t>
+            </a:r>
+            <a:r>
+              <a:rPr lang="en-US" dirty="0" smtClean="0"/>
+              <a:t>!</a:t>
+            </a:r>
+          </a:p>
+          <a:p>
+            <a:pPr lvl="1" fontAlgn="base"/>
+            <a:r>
+              <a:rPr lang="en-US" b="1" dirty="0" smtClean="0"/>
+              <a:t>Dummies</a:t>
+            </a:r>
+            <a:r>
+              <a:rPr lang="en-US" dirty="0" smtClean="0"/>
+              <a:t> - objects </a:t>
+            </a:r>
+            <a:r>
+              <a:rPr lang="en-US" dirty="0" smtClean="0"/>
+              <a:t>are passed around but never </a:t>
+            </a:r>
+            <a:r>
+              <a:rPr lang="en-US" dirty="0" smtClean="0"/>
+              <a:t>used</a:t>
+            </a:r>
+            <a:endParaRPr lang="en-US" dirty="0" smtClean="0"/>
+          </a:p>
+          <a:p>
+            <a:pPr lvl="1" fontAlgn="base"/>
+            <a:r>
+              <a:rPr lang="en-US" b="1" dirty="0" smtClean="0"/>
+              <a:t>Fake</a:t>
+            </a:r>
+            <a:r>
+              <a:rPr lang="en-US" dirty="0" smtClean="0"/>
+              <a:t> </a:t>
+            </a:r>
+            <a:r>
+              <a:rPr lang="en-US" dirty="0" smtClean="0"/>
+              <a:t>- working implementations with possible shortcuts</a:t>
+            </a:r>
+          </a:p>
+          <a:p>
+            <a:pPr lvl="1" fontAlgn="base"/>
+            <a:r>
+              <a:rPr lang="en-US" b="1" dirty="0" smtClean="0"/>
+              <a:t>Stubs</a:t>
+            </a:r>
+            <a:r>
+              <a:rPr lang="en-US" dirty="0" smtClean="0"/>
+              <a:t> </a:t>
+            </a:r>
+            <a:r>
+              <a:rPr lang="en-US" dirty="0" smtClean="0"/>
+              <a:t>- provide canned answers (answer state questions)</a:t>
+            </a:r>
+            <a:endParaRPr lang="en-US" dirty="0" smtClean="0"/>
+          </a:p>
+          <a:p>
+            <a:pPr lvl="1" fontAlgn="base"/>
+            <a:r>
+              <a:rPr lang="en-US" b="1" dirty="0" smtClean="0"/>
+              <a:t>Mocks</a:t>
+            </a:r>
+            <a:r>
+              <a:rPr lang="en-US" dirty="0" smtClean="0"/>
+              <a:t> </a:t>
+            </a:r>
+            <a:r>
+              <a:rPr lang="en-US" dirty="0" smtClean="0"/>
+              <a:t>- objects with you can set expectations and verify behavior on</a:t>
+            </a:r>
+          </a:p>
+          <a:p>
+            <a:pPr fontAlgn="base"/>
+            <a:r>
+              <a:rPr lang="en-US" dirty="0" smtClean="0"/>
+              <a:t>Known as test doubles</a:t>
             </a:r>
             <a:endParaRPr lang="en-US" dirty="0"/>
           </a:p>
@@ -5250,21 +5362,37 @@
             <p:ph type="title"/>
           </p:nvPr>
         </p:nvSpPr>
-        <p:spPr>
-          <a:xfrm>
-            <a:off x="457200" y="2857500"/>
-            <a:ext cx="8229600" cy="1143000"/>
-          </a:xfrm>
-        </p:spPr>
-        <p:txBody>
-          <a:bodyPr>
-            <a:normAutofit/>
-          </a:bodyPr>
-          <a:lstStyle/>
-          <a:p>
-            <a:r>
-              <a:rPr lang="en-US" dirty="0" smtClean="0"/>
-              <a:t>Behavior Driven Development…</a:t>
+        <p:spPr/>
+        <p:txBody>
+          <a:bodyPr/>
+          <a:lstStyle/>
+          <a:p>
+            <a:r>
+              <a:rPr lang="en-US" dirty="0" smtClean="0"/>
+              <a:t>Test Doubles – is it okay to blend?</a:t>
+            </a:r>
+            <a:endParaRPr lang="en-US" dirty="0"/>
+          </a:p>
+        </p:txBody>
+      </p:sp>
+      <p:sp>
+        <p:nvSpPr>
+          <p:cNvPr id="3" name="Content Placeholder 2"/>
+          <p:cNvSpPr>
+            <a:spLocks noGrp="1"/>
+          </p:cNvSpPr>
+          <p:nvPr>
+            <p:ph idx="1"/>
+          </p:nvPr>
+        </p:nvSpPr>
+        <p:spPr/>
+        <p:txBody>
+          <a:bodyPr/>
+          <a:lstStyle/>
+          <a:p>
+            <a:r>
+              <a:rPr lang="en-US" dirty="0" smtClean="0"/>
+              <a:t>Most of us never write a true stub/fake/mock/etc but something that blends ideas from each of these</a:t>
             </a:r>
             <a:endParaRPr lang="en-US" dirty="0"/>
           </a:p>
@@ -5312,53 +5440,21 @@
             <p:ph type="title"/>
           </p:nvPr>
         </p:nvSpPr>
-        <p:spPr/>
-        <p:txBody>
-          <a:bodyPr/>
-          <a:lstStyle/>
-          <a:p>
-            <a:r>
-              <a:rPr lang="en-US" dirty="0" smtClean="0"/>
-              <a:t>This is not BDD..</a:t>
-            </a:r>
-            <a:endParaRPr lang="en-US" dirty="0"/>
-          </a:p>
-        </p:txBody>
-      </p:sp>
-      <p:sp>
-        <p:nvSpPr>
-          <p:cNvPr id="3" name="Content Placeholder 2"/>
-          <p:cNvSpPr>
-            <a:spLocks noGrp="1"/>
-          </p:cNvSpPr>
-          <p:nvPr>
-            <p:ph idx="1"/>
-          </p:nvPr>
-        </p:nvSpPr>
-        <p:spPr/>
-        <p:txBody>
-          <a:bodyPr/>
-          <a:lstStyle/>
-          <a:p>
-            <a:r>
-              <a:rPr lang="en-US" dirty="0" smtClean="0"/>
-              <a:t>..but  the style of writing for your tests in a natural language</a:t>
-            </a:r>
-          </a:p>
-          <a:p>
-            <a:r>
-              <a:rPr lang="en-US" dirty="0" smtClean="0"/>
-              <a:t>Describe behaviors and interactions</a:t>
-            </a:r>
-          </a:p>
-          <a:p>
-            <a:r>
-              <a:rPr lang="en-US" dirty="0" smtClean="0"/>
-              <a:t>Think not about “tests” but about behaviors </a:t>
-            </a:r>
-            <a:r>
-              <a:rPr lang="en-US" smtClean="0"/>
-              <a:t>and specifications</a:t>
+        <p:spPr>
+          <a:xfrm>
+            <a:off x="457200" y="2857500"/>
+            <a:ext cx="8229600" cy="1143000"/>
+          </a:xfrm>
+        </p:spPr>
+        <p:txBody>
+          <a:bodyPr>
+            <a:normAutofit/>
+          </a:bodyPr>
+          <a:lstStyle/>
+          <a:p>
+            <a:r>
+              <a:rPr lang="en-US" dirty="0" smtClean="0"/>
+              <a:t>Behavior Driven Development…</a:t>
             </a:r>
             <a:endParaRPr lang="en-US" dirty="0"/>
           </a:p>
@@ -5369,6 +5465,13 @@
   <p:clrMapOvr>
     <a:masterClrMapping/>
   </p:clrMapOvr>
+  <p:timing>
+    <p:tnLst>
+      <p:par>
+        <p:cTn id="1" dur="indefinite" restart="never" nodeType="tmRoot"/>
+      </p:par>
+    </p:tnLst>
+  </p:timing>
 </p:sld>
 </file>
 
@@ -5399,21 +5502,72 @@
             <p:ph type="title"/>
           </p:nvPr>
         </p:nvSpPr>
-        <p:spPr>
-          <a:xfrm>
-            <a:off x="457200" y="2857500"/>
-            <a:ext cx="8229600" cy="1143000"/>
-          </a:xfrm>
-        </p:spPr>
-        <p:txBody>
-          <a:bodyPr>
-            <a:normAutofit/>
-          </a:bodyPr>
-          <a:lstStyle/>
-          <a:p>
-            <a:r>
-              <a:rPr lang="en-US" dirty="0" smtClean="0"/>
-              <a:t>…but like for PowerShell</a:t>
+        <p:spPr/>
+        <p:txBody>
+          <a:bodyPr/>
+          <a:lstStyle/>
+          <a:p>
+            <a:r>
+              <a:rPr lang="en-US" dirty="0" smtClean="0"/>
+              <a:t>This is not </a:t>
+            </a:r>
+            <a:r>
+              <a:rPr lang="en-US" dirty="0" smtClean="0"/>
+              <a:t>BDD…</a:t>
+            </a:r>
+            <a:endParaRPr lang="en-US" dirty="0"/>
+          </a:p>
+        </p:txBody>
+      </p:sp>
+      <p:sp>
+        <p:nvSpPr>
+          <p:cNvPr id="3" name="Content Placeholder 2"/>
+          <p:cNvSpPr>
+            <a:spLocks noGrp="1"/>
+          </p:cNvSpPr>
+          <p:nvPr>
+            <p:ph idx="1"/>
+          </p:nvPr>
+        </p:nvSpPr>
+        <p:spPr/>
+        <p:txBody>
+          <a:bodyPr/>
+          <a:lstStyle/>
+          <a:p>
+            <a:r>
+              <a:rPr lang="en-US" dirty="0" smtClean="0"/>
+              <a:t>...</a:t>
+            </a:r>
+            <a:r>
+              <a:rPr lang="en-US" dirty="0" smtClean="0"/>
+              <a:t>but  the style of writing for your tests in a natural </a:t>
+            </a:r>
+            <a:r>
+              <a:rPr lang="en-US" dirty="0" smtClean="0"/>
+              <a:t>language</a:t>
+            </a:r>
+          </a:p>
+          <a:p>
+            <a:r>
+              <a:rPr lang="en-US" dirty="0" smtClean="0"/>
+              <a:t>BDD can be a religious battle and this talk is not about </a:t>
+            </a:r>
+            <a:r>
+              <a:rPr lang="en-US" dirty="0" smtClean="0"/>
+              <a:t>that (check out Dan North for more info)</a:t>
+            </a:r>
+            <a:endParaRPr lang="en-US" dirty="0" smtClean="0"/>
+          </a:p>
+          <a:p>
+            <a:r>
+              <a:rPr lang="en-US" dirty="0" smtClean="0"/>
+              <a:t>Describe behaviors and interactions</a:t>
+            </a:r>
+          </a:p>
+          <a:p>
+            <a:r>
+              <a:rPr lang="en-US" dirty="0" smtClean="0"/>
+              <a:t>Think not about “tests” but about behaviors and specifications</a:t>
             </a:r>
             <a:endParaRPr lang="en-US" dirty="0"/>
           </a:p>
@@ -5461,6 +5615,130 @@
             <p:ph type="title"/>
           </p:nvPr>
         </p:nvSpPr>
+        <p:spPr>
+          <a:xfrm>
+            <a:off x="457200" y="2857500"/>
+            <a:ext cx="8229600" cy="1143000"/>
+          </a:xfrm>
+        </p:spPr>
+        <p:txBody>
+          <a:bodyPr>
+            <a:normAutofit/>
+          </a:bodyPr>
+          <a:lstStyle/>
+          <a:p>
+            <a:r>
+              <a:rPr lang="en-US" dirty="0" smtClean="0"/>
+              <a:t>Demo</a:t>
+            </a:r>
+            <a:endParaRPr lang="en-US" dirty="0"/>
+          </a:p>
+        </p:txBody>
+      </p:sp>
+    </p:spTree>
+  </p:cSld>
+  <p:clrMapOvr>
+    <a:masterClrMapping/>
+  </p:clrMapOvr>
+  <p:timing>
+    <p:tnLst>
+      <p:par>
+        <p:cTn id="1" dur="indefinite" restart="never" nodeType="tmRoot"/>
+      </p:par>
+    </p:tnLst>
+  </p:timing>
+</p:sld>
+</file>
+
+<file path=ppt/slides/slide27.xml><?xml version="1.0" encoding="utf-8"?>
+<p:sld xmlns:a="http://schemas.openxmlformats.org/drawingml/2006/main" xmlns:r="http://schemas.openxmlformats.org/officeDocument/2006/relationships" xmlns:p="http://schemas.openxmlformats.org/presentationml/2006/main">
+  <p:cSld>
+    <p:spTree>
+      <p:nvGrpSpPr>
+        <p:cNvPr id="1" name=""/>
+        <p:cNvGrpSpPr/>
+        <p:nvPr/>
+      </p:nvGrpSpPr>
+      <p:grpSpPr>
+        <a:xfrm>
+          <a:off x="0" y="0"/>
+          <a:ext cx="0" cy="0"/>
+          <a:chOff x="0" y="0"/>
+          <a:chExt cx="0" cy="0"/>
+        </a:xfrm>
+      </p:grpSpPr>
+      <p:sp>
+        <p:nvSpPr>
+          <p:cNvPr id="2" name="Title 1"/>
+          <p:cNvSpPr>
+            <a:spLocks noGrp="1"/>
+          </p:cNvSpPr>
+          <p:nvPr>
+            <p:ph type="title"/>
+          </p:nvPr>
+        </p:nvSpPr>
+        <p:spPr>
+          <a:xfrm>
+            <a:off x="457200" y="2857500"/>
+            <a:ext cx="8229600" cy="1143000"/>
+          </a:xfrm>
+        </p:spPr>
+        <p:txBody>
+          <a:bodyPr>
+            <a:normAutofit/>
+          </a:bodyPr>
+          <a:lstStyle/>
+          <a:p>
+            <a:r>
+              <a:rPr lang="en-US" dirty="0" smtClean="0"/>
+              <a:t>…but like for PowerShell</a:t>
+            </a:r>
+            <a:endParaRPr lang="en-US" dirty="0"/>
+          </a:p>
+        </p:txBody>
+      </p:sp>
+    </p:spTree>
+  </p:cSld>
+  <p:clrMapOvr>
+    <a:masterClrMapping/>
+  </p:clrMapOvr>
+  <p:timing>
+    <p:tnLst>
+      <p:par>
+        <p:cTn id="1" dur="indefinite" restart="never" nodeType="tmRoot"/>
+      </p:par>
+    </p:tnLst>
+  </p:timing>
+</p:sld>
+</file>
+
+<file path=ppt/slides/slide28.xml><?xml version="1.0" encoding="utf-8"?>
+<p:sld xmlns:a="http://schemas.openxmlformats.org/drawingml/2006/main" xmlns:r="http://schemas.openxmlformats.org/officeDocument/2006/relationships" xmlns:p="http://schemas.openxmlformats.org/presentationml/2006/main">
+  <p:cSld>
+    <p:spTree>
+      <p:nvGrpSpPr>
+        <p:cNvPr id="1" name=""/>
+        <p:cNvGrpSpPr/>
+        <p:nvPr/>
+      </p:nvGrpSpPr>
+      <p:grpSpPr>
+        <a:xfrm>
+          <a:off x="0" y="0"/>
+          <a:ext cx="0" cy="0"/>
+          <a:chOff x="0" y="0"/>
+          <a:chExt cx="0" cy="0"/>
+        </a:xfrm>
+      </p:grpSpPr>
+      <p:sp>
+        <p:nvSpPr>
+          <p:cNvPr id="2" name="Title 1"/>
+          <p:cNvSpPr>
+            <a:spLocks noGrp="1"/>
+          </p:cNvSpPr>
+          <p:nvPr>
+            <p:ph type="title"/>
+          </p:nvPr>
+        </p:nvSpPr>
         <p:spPr/>
         <p:txBody>
           <a:bodyPr/>
@@ -5493,7 +5771,6 @@
               <a:rPr lang="en-US" dirty="0" smtClean="0"/>
               <a:t>https://github.com/scottmuc/Pester</a:t>
             </a:r>
-            <a:endParaRPr lang="en-US" dirty="0" smtClean="0"/>
           </a:p>
           <a:p>
             <a:r>
@@ -5543,160 +5820,13 @@
   <p:clrMapOvr>
     <a:masterClrMapping/>
   </p:clrMapOvr>
-</p:sld>
-</file>
-
-<file path=ppt/slides/slide27.xml><?xml version="1.0" encoding="utf-8"?>
-<p:sld xmlns:a="http://schemas.openxmlformats.org/drawingml/2006/main" xmlns:r="http://schemas.openxmlformats.org/officeDocument/2006/relationships" xmlns:p="http://schemas.openxmlformats.org/presentationml/2006/main">
-  <p:cSld>
-    <p:spTree>
-      <p:nvGrpSpPr>
-        <p:cNvPr id="1" name=""/>
-        <p:cNvGrpSpPr/>
-        <p:nvPr/>
-      </p:nvGrpSpPr>
-      <p:grpSpPr>
-        <a:xfrm>
-          <a:off x="0" y="0"/>
-          <a:ext cx="0" cy="0"/>
-          <a:chOff x="0" y="0"/>
-          <a:chExt cx="0" cy="0"/>
-        </a:xfrm>
-      </p:grpSpPr>
-      <p:sp>
-        <p:nvSpPr>
-          <p:cNvPr id="2" name="Title 1"/>
-          <p:cNvSpPr>
-            <a:spLocks noGrp="1"/>
-          </p:cNvSpPr>
-          <p:nvPr>
-            <p:ph type="title"/>
-          </p:nvPr>
-        </p:nvSpPr>
-        <p:spPr/>
-        <p:txBody>
-          <a:bodyPr/>
-          <a:lstStyle/>
-          <a:p>
-            <a:r>
-              <a:rPr lang="en-US" dirty="0" smtClean="0"/>
-              <a:t>But is Pester enough?</a:t>
-            </a:r>
-            <a:endParaRPr lang="en-US" dirty="0"/>
-          </a:p>
-        </p:txBody>
-      </p:sp>
-      <p:sp>
-        <p:nvSpPr>
-          <p:cNvPr id="3" name="Content Placeholder 2"/>
-          <p:cNvSpPr>
-            <a:spLocks noGrp="1"/>
-          </p:cNvSpPr>
-          <p:nvPr>
-            <p:ph idx="1"/>
-          </p:nvPr>
-        </p:nvSpPr>
-        <p:spPr/>
-        <p:txBody>
-          <a:bodyPr/>
-          <a:lstStyle/>
-          <a:p>
-            <a:r>
-              <a:rPr lang="en-US" dirty="0" smtClean="0"/>
-              <a:t>Does not get you to unit testing alone</a:t>
-            </a:r>
-          </a:p>
-          <a:p>
-            <a:r>
-              <a:rPr lang="en-US" dirty="0" smtClean="0"/>
-              <a:t>Does no mocking</a:t>
-            </a:r>
-            <a:endParaRPr lang="en-US" dirty="0"/>
-          </a:p>
-        </p:txBody>
-      </p:sp>
-    </p:spTree>
-  </p:cSld>
-  <p:clrMapOvr>
-    <a:masterClrMapping/>
-  </p:clrMapOvr>
-</p:sld>
-</file>
-
-<file path=ppt/slides/slide28.xml><?xml version="1.0" encoding="utf-8"?>
-<p:sld xmlns:a="http://schemas.openxmlformats.org/drawingml/2006/main" xmlns:r="http://schemas.openxmlformats.org/officeDocument/2006/relationships" xmlns:p="http://schemas.openxmlformats.org/presentationml/2006/main">
-  <p:cSld>
-    <p:spTree>
-      <p:nvGrpSpPr>
-        <p:cNvPr id="1" name=""/>
-        <p:cNvGrpSpPr/>
-        <p:nvPr/>
-      </p:nvGrpSpPr>
-      <p:grpSpPr>
-        <a:xfrm>
-          <a:off x="0" y="0"/>
-          <a:ext cx="0" cy="0"/>
-          <a:chOff x="0" y="0"/>
-          <a:chExt cx="0" cy="0"/>
-        </a:xfrm>
-      </p:grpSpPr>
-      <p:sp>
-        <p:nvSpPr>
-          <p:cNvPr id="2" name="Title 1"/>
-          <p:cNvSpPr>
-            <a:spLocks noGrp="1"/>
-          </p:cNvSpPr>
-          <p:nvPr>
-            <p:ph type="title"/>
-          </p:nvPr>
-        </p:nvSpPr>
-        <p:spPr/>
-        <p:txBody>
-          <a:bodyPr/>
-          <a:lstStyle/>
-          <a:p>
-            <a:r>
-              <a:rPr lang="en-US" dirty="0" smtClean="0"/>
-              <a:t>How to get there</a:t>
-            </a:r>
-            <a:endParaRPr lang="en-US" dirty="0"/>
-          </a:p>
-        </p:txBody>
-      </p:sp>
-      <p:sp>
-        <p:nvSpPr>
-          <p:cNvPr id="3" name="Content Placeholder 2"/>
-          <p:cNvSpPr>
-            <a:spLocks noGrp="1"/>
-          </p:cNvSpPr>
-          <p:nvPr>
-            <p:ph idx="1"/>
-          </p:nvPr>
-        </p:nvSpPr>
-        <p:spPr/>
-        <p:txBody>
-          <a:bodyPr/>
-          <a:lstStyle/>
-          <a:p>
-            <a:r>
-              <a:rPr lang="en-US" dirty="0" smtClean="0"/>
-              <a:t>A little ingenuity</a:t>
-            </a:r>
-          </a:p>
-          <a:p>
-            <a:r>
-              <a:rPr lang="en-US" dirty="0" smtClean="0"/>
-              <a:t>Maybe a mocking framework for PowerShell in the future</a:t>
-            </a:r>
-            <a:endParaRPr lang="en-US" dirty="0"/>
-          </a:p>
-        </p:txBody>
-      </p:sp>
-    </p:spTree>
-  </p:cSld>
-  <p:clrMapOvr>
-    <a:masterClrMapping/>
-  </p:clrMapOvr>
+  <p:timing>
+    <p:tnLst>
+      <p:par>
+        <p:cTn id="1" dur="indefinite" restart="never" nodeType="tmRoot"/>
+      </p:par>
+    </p:tnLst>
+  </p:timing>
 </p:sld>
 </file>
 
@@ -5727,47 +5857,23 @@
             <p:ph type="title"/>
           </p:nvPr>
         </p:nvSpPr>
-        <p:spPr/>
-        <p:txBody>
-          <a:bodyPr/>
-          <a:lstStyle/>
-          <a:p>
-            <a:r>
-              <a:rPr lang="en-US" dirty="0" smtClean="0"/>
-              <a:t>PowerShell Unit Testing</a:t>
+        <p:spPr>
+          <a:xfrm>
+            <a:off x="457200" y="2857500"/>
+            <a:ext cx="8229600" cy="1143000"/>
+          </a:xfrm>
+        </p:spPr>
+        <p:txBody>
+          <a:bodyPr>
+            <a:normAutofit/>
+          </a:bodyPr>
+          <a:lstStyle/>
+          <a:p>
+            <a:r>
+              <a:rPr lang="en-US" dirty="0" smtClean="0"/>
+              <a:t>Demo</a:t>
             </a:r>
             <a:endParaRPr lang="en-US" dirty="0"/>
-          </a:p>
-        </p:txBody>
-      </p:sp>
-      <p:sp>
-        <p:nvSpPr>
-          <p:cNvPr id="3" name="Content Placeholder 2"/>
-          <p:cNvSpPr>
-            <a:spLocks noGrp="1"/>
-          </p:cNvSpPr>
-          <p:nvPr>
-            <p:ph idx="1"/>
-          </p:nvPr>
-        </p:nvSpPr>
-        <p:spPr/>
-        <p:txBody>
-          <a:bodyPr/>
-          <a:lstStyle/>
-          <a:p>
-            <a:r>
-              <a:rPr lang="en-US" dirty="0" smtClean="0"/>
-              <a:t>A PowerShell unit is a function</a:t>
-            </a:r>
-          </a:p>
-          <a:p>
-            <a:endParaRPr lang="en-US" dirty="0" smtClean="0"/>
-          </a:p>
-          <a:p>
-            <a:r>
-              <a:rPr lang="en-US" dirty="0" smtClean="0"/>
-              <a:t>Functions can be overwritten by scoping a function of the same name</a:t>
-            </a:r>
           </a:p>
         </p:txBody>
       </p:sp>
@@ -5969,7 +6075,7 @@
           <a:p>
             <a:r>
               <a:rPr lang="en-US" dirty="0" smtClean="0"/>
-              <a:t>PowerShell Stubbing</a:t>
+              <a:t>But is Pester enough?</a:t>
             </a:r>
             <a:endParaRPr lang="en-US" dirty="0"/>
           </a:p>
@@ -5992,23 +6098,19 @@
           <a:p>
             <a:r>
               <a:rPr lang="en-US" dirty="0" smtClean="0"/>
-              <a:t>Functions can be overwritten by a function of the same name and parameters</a:t>
-            </a:r>
-          </a:p>
-          <a:p>
-            <a:r>
-              <a:rPr lang="en-US" dirty="0" smtClean="0"/>
-              <a:t>This allows you to interrupt and stub the functionality</a:t>
-            </a:r>
-          </a:p>
-          <a:p>
-            <a:endParaRPr lang="en-US" dirty="0" smtClean="0"/>
-          </a:p>
-          <a:p>
-            <a:r>
-              <a:rPr lang="en-US" dirty="0" smtClean="0"/>
-              <a:t>“I want behavior verification. I want my mock”</a:t>
-            </a:r>
+              <a:t>Does not get you to unit testing alone</a:t>
+            </a:r>
+          </a:p>
+          <a:p>
+            <a:r>
+              <a:rPr lang="en-US" dirty="0" smtClean="0"/>
+              <a:t>Does no </a:t>
+            </a:r>
+            <a:r>
+              <a:rPr lang="en-US" dirty="0" smtClean="0"/>
+              <a:t>mocking/stubbing</a:t>
+            </a:r>
+            <a:endParaRPr lang="en-US" dirty="0"/>
           </a:p>
         </p:txBody>
       </p:sp>
@@ -6061,7 +6163,7 @@
           <a:p>
             <a:r>
               <a:rPr lang="en-US" dirty="0" smtClean="0"/>
-              <a:t>PowerShell Mocking</a:t>
+              <a:t>How to get there</a:t>
             </a:r>
             <a:endParaRPr lang="en-US" dirty="0"/>
           </a:p>
@@ -6084,8 +6186,53 @@
           <a:p>
             <a:r>
               <a:rPr lang="en-US" dirty="0" smtClean="0"/>
-              <a:t>After you have implemented the stubs you allow different behaviors to be returned through conventional properties and flags</a:t>
-            </a:r>
+              <a:t>A little ingenuity</a:t>
+            </a:r>
+          </a:p>
+          <a:p>
+            <a:r>
+              <a:rPr lang="en-US" dirty="0" smtClean="0"/>
+              <a:t>Maybe a </a:t>
+            </a:r>
+            <a:r>
+              <a:rPr lang="en-US" dirty="0" smtClean="0"/>
+              <a:t>mocking/stub </a:t>
+            </a:r>
+            <a:r>
+              <a:rPr lang="en-US" dirty="0" smtClean="0"/>
+              <a:t>framework for PowerShell in the </a:t>
+            </a:r>
+            <a:r>
+              <a:rPr lang="en-US" dirty="0" smtClean="0"/>
+              <a:t>future – what would you name it?</a:t>
+            </a:r>
+          </a:p>
+          <a:p>
+            <a:pPr lvl="1"/>
+            <a:r>
+              <a:rPr lang="en-US" dirty="0" err="1" smtClean="0"/>
+              <a:t>PowerMock</a:t>
+            </a:r>
+            <a:r>
+              <a:rPr lang="en-US" dirty="0" smtClean="0"/>
+              <a:t>?</a:t>
+            </a:r>
+          </a:p>
+          <a:p>
+            <a:pPr lvl="1"/>
+            <a:r>
+              <a:rPr lang="en-US" dirty="0" err="1" smtClean="0"/>
+              <a:t>PSomething</a:t>
+            </a:r>
+            <a:endParaRPr lang="en-US" dirty="0" smtClean="0"/>
+          </a:p>
+          <a:p>
+            <a:pPr lvl="1"/>
+            <a:r>
+              <a:rPr lang="en-US" dirty="0" err="1" smtClean="0"/>
+              <a:t>PShellshock</a:t>
+            </a:r>
+            <a:endParaRPr lang="en-US" dirty="0"/>
           </a:p>
         </p:txBody>
       </p:sp>
@@ -6131,23 +6278,47 @@
             <p:ph type="title"/>
           </p:nvPr>
         </p:nvSpPr>
-        <p:spPr>
-          <a:xfrm>
-            <a:off x="457200" y="2857500"/>
-            <a:ext cx="8229600" cy="1143000"/>
-          </a:xfrm>
-        </p:spPr>
-        <p:txBody>
-          <a:bodyPr>
-            <a:normAutofit/>
-          </a:bodyPr>
-          <a:lstStyle/>
-          <a:p>
-            <a:r>
-              <a:rPr lang="en-US" dirty="0" smtClean="0"/>
-              <a:t>Demo</a:t>
+        <p:spPr/>
+        <p:txBody>
+          <a:bodyPr/>
+          <a:lstStyle/>
+          <a:p>
+            <a:r>
+              <a:rPr lang="en-US" dirty="0" smtClean="0"/>
+              <a:t>PowerShell Unit Testing</a:t>
             </a:r>
             <a:endParaRPr lang="en-US" dirty="0"/>
+          </a:p>
+        </p:txBody>
+      </p:sp>
+      <p:sp>
+        <p:nvSpPr>
+          <p:cNvPr id="3" name="Content Placeholder 2"/>
+          <p:cNvSpPr>
+            <a:spLocks noGrp="1"/>
+          </p:cNvSpPr>
+          <p:nvPr>
+            <p:ph idx="1"/>
+          </p:nvPr>
+        </p:nvSpPr>
+        <p:spPr/>
+        <p:txBody>
+          <a:bodyPr/>
+          <a:lstStyle/>
+          <a:p>
+            <a:r>
+              <a:rPr lang="en-US" dirty="0" smtClean="0"/>
+              <a:t>A PowerShell unit is a function</a:t>
+            </a:r>
+          </a:p>
+          <a:p>
+            <a:endParaRPr lang="en-US" dirty="0" smtClean="0"/>
+          </a:p>
+          <a:p>
+            <a:r>
+              <a:rPr lang="en-US" dirty="0" smtClean="0"/>
+              <a:t>Functions can be overwritten by scoping a function of the same name</a:t>
+            </a:r>
           </a:p>
         </p:txBody>
       </p:sp>
@@ -6200,6 +6371,237 @@
           <a:p>
             <a:r>
               <a:rPr lang="en-US" dirty="0" smtClean="0"/>
+              <a:t>PowerShell Stubbing</a:t>
+            </a:r>
+            <a:endParaRPr lang="en-US" dirty="0"/>
+          </a:p>
+        </p:txBody>
+      </p:sp>
+      <p:sp>
+        <p:nvSpPr>
+          <p:cNvPr id="3" name="Content Placeholder 2"/>
+          <p:cNvSpPr>
+            <a:spLocks noGrp="1"/>
+          </p:cNvSpPr>
+          <p:nvPr>
+            <p:ph idx="1"/>
+          </p:nvPr>
+        </p:nvSpPr>
+        <p:spPr/>
+        <p:txBody>
+          <a:bodyPr/>
+          <a:lstStyle/>
+          <a:p>
+            <a:r>
+              <a:rPr lang="en-US" dirty="0" smtClean="0"/>
+              <a:t>Functions can be overwritten by a function of the same name and parameters</a:t>
+            </a:r>
+          </a:p>
+          <a:p>
+            <a:r>
+              <a:rPr lang="en-US" dirty="0" smtClean="0"/>
+              <a:t>This allows you to interrupt and stub the functionality</a:t>
+            </a:r>
+          </a:p>
+          <a:p>
+            <a:endParaRPr lang="en-US" dirty="0" smtClean="0"/>
+          </a:p>
+          <a:p>
+            <a:r>
+              <a:rPr lang="en-US" dirty="0" smtClean="0"/>
+              <a:t>“I want behavior verification. I want my mock”</a:t>
+            </a:r>
+          </a:p>
+        </p:txBody>
+      </p:sp>
+    </p:spTree>
+  </p:cSld>
+  <p:clrMapOvr>
+    <a:masterClrMapping/>
+  </p:clrMapOvr>
+  <p:timing>
+    <p:tnLst>
+      <p:par>
+        <p:cTn id="1" dur="indefinite" restart="never" nodeType="tmRoot"/>
+      </p:par>
+    </p:tnLst>
+  </p:timing>
+</p:sld>
+</file>
+
+<file path=ppt/slides/slide34.xml><?xml version="1.0" encoding="utf-8"?>
+<p:sld xmlns:a="http://schemas.openxmlformats.org/drawingml/2006/main" xmlns:r="http://schemas.openxmlformats.org/officeDocument/2006/relationships" xmlns:p="http://schemas.openxmlformats.org/presentationml/2006/main">
+  <p:cSld>
+    <p:spTree>
+      <p:nvGrpSpPr>
+        <p:cNvPr id="1" name=""/>
+        <p:cNvGrpSpPr/>
+        <p:nvPr/>
+      </p:nvGrpSpPr>
+      <p:grpSpPr>
+        <a:xfrm>
+          <a:off x="0" y="0"/>
+          <a:ext cx="0" cy="0"/>
+          <a:chOff x="0" y="0"/>
+          <a:chExt cx="0" cy="0"/>
+        </a:xfrm>
+      </p:grpSpPr>
+      <p:sp>
+        <p:nvSpPr>
+          <p:cNvPr id="2" name="Title 1"/>
+          <p:cNvSpPr>
+            <a:spLocks noGrp="1"/>
+          </p:cNvSpPr>
+          <p:nvPr>
+            <p:ph type="title"/>
+          </p:nvPr>
+        </p:nvSpPr>
+        <p:spPr/>
+        <p:txBody>
+          <a:bodyPr/>
+          <a:lstStyle/>
+          <a:p>
+            <a:r>
+              <a:rPr lang="en-US" dirty="0" smtClean="0"/>
+              <a:t>PowerShell Mocking</a:t>
+            </a:r>
+            <a:endParaRPr lang="en-US" dirty="0"/>
+          </a:p>
+        </p:txBody>
+      </p:sp>
+      <p:sp>
+        <p:nvSpPr>
+          <p:cNvPr id="3" name="Content Placeholder 2"/>
+          <p:cNvSpPr>
+            <a:spLocks noGrp="1"/>
+          </p:cNvSpPr>
+          <p:nvPr>
+            <p:ph idx="1"/>
+          </p:nvPr>
+        </p:nvSpPr>
+        <p:spPr/>
+        <p:txBody>
+          <a:bodyPr/>
+          <a:lstStyle/>
+          <a:p>
+            <a:r>
+              <a:rPr lang="en-US" dirty="0" smtClean="0"/>
+              <a:t>After you have implemented the stubs you allow different behaviors to be returned through conventional properties and flags</a:t>
+            </a:r>
+          </a:p>
+        </p:txBody>
+      </p:sp>
+    </p:spTree>
+  </p:cSld>
+  <p:clrMapOvr>
+    <a:masterClrMapping/>
+  </p:clrMapOvr>
+  <p:timing>
+    <p:tnLst>
+      <p:par>
+        <p:cTn id="1" dur="indefinite" restart="never" nodeType="tmRoot"/>
+      </p:par>
+    </p:tnLst>
+  </p:timing>
+</p:sld>
+</file>
+
+<file path=ppt/slides/slide35.xml><?xml version="1.0" encoding="utf-8"?>
+<p:sld xmlns:a="http://schemas.openxmlformats.org/drawingml/2006/main" xmlns:r="http://schemas.openxmlformats.org/officeDocument/2006/relationships" xmlns:p="http://schemas.openxmlformats.org/presentationml/2006/main">
+  <p:cSld>
+    <p:spTree>
+      <p:nvGrpSpPr>
+        <p:cNvPr id="1" name=""/>
+        <p:cNvGrpSpPr/>
+        <p:nvPr/>
+      </p:nvGrpSpPr>
+      <p:grpSpPr>
+        <a:xfrm>
+          <a:off x="0" y="0"/>
+          <a:ext cx="0" cy="0"/>
+          <a:chOff x="0" y="0"/>
+          <a:chExt cx="0" cy="0"/>
+        </a:xfrm>
+      </p:grpSpPr>
+      <p:sp>
+        <p:nvSpPr>
+          <p:cNvPr id="2" name="Title 1"/>
+          <p:cNvSpPr>
+            <a:spLocks noGrp="1"/>
+          </p:cNvSpPr>
+          <p:nvPr>
+            <p:ph type="title"/>
+          </p:nvPr>
+        </p:nvSpPr>
+        <p:spPr>
+          <a:xfrm>
+            <a:off x="457200" y="2857500"/>
+            <a:ext cx="8229600" cy="1143000"/>
+          </a:xfrm>
+        </p:spPr>
+        <p:txBody>
+          <a:bodyPr>
+            <a:normAutofit/>
+          </a:bodyPr>
+          <a:lstStyle/>
+          <a:p>
+            <a:r>
+              <a:rPr lang="en-US" dirty="0" smtClean="0"/>
+              <a:t>Demo</a:t>
+            </a:r>
+            <a:endParaRPr lang="en-US" dirty="0"/>
+          </a:p>
+        </p:txBody>
+      </p:sp>
+    </p:spTree>
+  </p:cSld>
+  <p:clrMapOvr>
+    <a:masterClrMapping/>
+  </p:clrMapOvr>
+  <p:timing>
+    <p:tnLst>
+      <p:par>
+        <p:cTn id="1" dur="indefinite" restart="never" nodeType="tmRoot"/>
+      </p:par>
+    </p:tnLst>
+  </p:timing>
+</p:sld>
+</file>
+
+<file path=ppt/slides/slide36.xml><?xml version="1.0" encoding="utf-8"?>
+<p:sld xmlns:a="http://schemas.openxmlformats.org/drawingml/2006/main" xmlns:r="http://schemas.openxmlformats.org/officeDocument/2006/relationships" xmlns:p="http://schemas.openxmlformats.org/presentationml/2006/main">
+  <p:cSld>
+    <p:spTree>
+      <p:nvGrpSpPr>
+        <p:cNvPr id="1" name=""/>
+        <p:cNvGrpSpPr/>
+        <p:nvPr/>
+      </p:nvGrpSpPr>
+      <p:grpSpPr>
+        <a:xfrm>
+          <a:off x="0" y="0"/>
+          <a:ext cx="0" cy="0"/>
+          <a:chOff x="0" y="0"/>
+          <a:chExt cx="0" cy="0"/>
+        </a:xfrm>
+      </p:grpSpPr>
+      <p:sp>
+        <p:nvSpPr>
+          <p:cNvPr id="2" name="Title 1"/>
+          <p:cNvSpPr>
+            <a:spLocks noGrp="1"/>
+          </p:cNvSpPr>
+          <p:nvPr>
+            <p:ph type="title"/>
+          </p:nvPr>
+        </p:nvSpPr>
+        <p:spPr/>
+        <p:txBody>
+          <a:bodyPr/>
+          <a:lstStyle/>
+          <a:p>
+            <a:r>
+              <a:rPr lang="en-US" dirty="0" smtClean="0"/>
               <a:t>Questions?</a:t>
             </a:r>
             <a:endParaRPr lang="en-US" dirty="0"/>
@@ -6237,29 +6639,32 @@
           <a:p>
             <a:r>
               <a:rPr lang="en-US" dirty="0" smtClean="0"/>
-              <a:t>Pester – </a:t>
-            </a:r>
-            <a:r>
-              <a:rPr lang="en-US" dirty="0" smtClean="0">
-                <a:hlinkClick r:id="rId2"/>
-              </a:rPr>
-              <a:t>https://github.com/scottmuc/Pester#readme</a:t>
-            </a:r>
-            <a:r>
-              <a:rPr lang="en-US" dirty="0" smtClean="0"/>
-              <a:t> </a:t>
-            </a:r>
-          </a:p>
-          <a:p>
-            <a:r>
-              <a:rPr lang="en-US" dirty="0" smtClean="0"/>
-              <a:t>Chocolatey – </a:t>
-            </a:r>
-            <a:r>
-              <a:rPr lang="en-US" dirty="0" smtClean="0">
-                <a:hlinkClick r:id="rId3"/>
-              </a:rPr>
-              <a:t>http://chocolatey.org</a:t>
+              <a:t>Pester – https://</a:t>
+            </a:r>
+            <a:r>
+              <a:rPr lang="en-US" dirty="0" smtClean="0"/>
+              <a:t>github.com/scottmuc/Pester#readme</a:t>
+            </a:r>
+            <a:endParaRPr lang="en-US" dirty="0" smtClean="0"/>
+          </a:p>
+          <a:p>
+            <a:r>
+              <a:rPr lang="en-US" dirty="0" smtClean="0"/>
+              <a:t>Chocolatey – http://</a:t>
+            </a:r>
+            <a:r>
+              <a:rPr lang="en-US" dirty="0" smtClean="0"/>
+              <a:t>chocolatey.org</a:t>
+            </a:r>
+          </a:p>
+          <a:p>
+            <a:r>
+              <a:rPr lang="en-US" dirty="0" smtClean="0"/>
+              <a:t>Mocks aren’t stubs -</a:t>
+            </a:r>
+            <a:r>
+              <a:rPr lang="en-US" dirty="0" smtClean="0"/>
+              <a:t>http://martinfowler.com/articles/mocksArentStubs.html</a:t>
             </a:r>
             <a:endParaRPr lang="en-US" dirty="0"/>
           </a:p>
@@ -6281,7 +6686,7 @@
 </p:sld>
 </file>
 
-<file path=ppt/slides/slide34.xml><?xml version="1.0" encoding="utf-8"?>
+<file path=ppt/slides/slide37.xml><?xml version="1.0" encoding="utf-8"?>
 <p:sld xmlns:a="http://schemas.openxmlformats.org/drawingml/2006/main" xmlns:r="http://schemas.openxmlformats.org/officeDocument/2006/relationships" xmlns:p="http://schemas.openxmlformats.org/presentationml/2006/main">
   <p:cSld>
     <p:spTree>
@@ -6481,13 +6886,8 @@
             </a:pPr>
             <a:r>
               <a:rPr lang="en-US" dirty="0" smtClean="0"/>
-              <a:t>http</a:t>
-            </a:r>
-            <a:r>
-              <a:rPr lang="en-US" dirty="0" smtClean="0"/>
-              <a:t>://bit.ly/powershellbdd </a:t>
-            </a:r>
-            <a:endParaRPr lang="en-US" dirty="0" smtClean="0"/>
+              <a:t>http://bit.ly/powershellbdd </a:t>
+            </a:r>
           </a:p>
         </p:txBody>
       </p:sp>

</xml_diff>